<commit_message>
updated some code snippets and text boxes
</commit_message>
<xml_diff>
--- a/Logic_Gate.pptx
+++ b/Logic_Gate.pptx
@@ -6,6 +6,7 @@
   </p:sldMasterIdLst>
   <p:sldIdLst>
     <p:sldId id="256" r:id="rId5"/>
+    <p:sldId id="257" r:id="rId6"/>
   </p:sldIdLst>
   <p:sldSz cx="12192000" cy="6858000"/>
   <p:notesSz cx="6858000" cy="9144000"/>
@@ -104,7 +105,409 @@
       </a:defRPr>
     </a:lvl9pPr>
   </p:defaultTextStyle>
+  <p:extLst>
+    <p:ext uri="{EFAFB233-063F-42B5-8137-9DF3F51BA10A}">
+      <p15:sldGuideLst xmlns:p15="http://schemas.microsoft.com/office/powerpoint/2012/main"/>
+    </p:ext>
+  </p:extLst>
 </p:presentation>
+</file>
+
+<file path=ppt/changesInfos/changesInfo1.xml><?xml version="1.0" encoding="utf-8"?>
+<pc:chgInfo xmlns:a="http://schemas.openxmlformats.org/drawingml/2006/main" xmlns:r="http://schemas.openxmlformats.org/officeDocument/2006/relationships" xmlns:ac="http://schemas.microsoft.com/office/drawing/2013/main/command" xmlns:pc="http://schemas.microsoft.com/office/powerpoint/2013/main/command">
+  <pc:docChgLst>
+    <pc:chgData name="Thomas Stuart" userId="c30a2a5e-a625-4fe5-91bb-6ef716ed15a4" providerId="ADAL" clId="{289FFF1B-0DC0-4ED9-99C7-E62FD8B7898E}"/>
+    <pc:docChg chg="undo custSel addSld modSld">
+      <pc:chgData name="Thomas Stuart" userId="c30a2a5e-a625-4fe5-91bb-6ef716ed15a4" providerId="ADAL" clId="{289FFF1B-0DC0-4ED9-99C7-E62FD8B7898E}" dt="2021-11-12T03:15:03.593" v="571" actId="20577"/>
+      <pc:docMkLst>
+        <pc:docMk/>
+      </pc:docMkLst>
+      <pc:sldChg chg="addSp delSp modSp add">
+        <pc:chgData name="Thomas Stuart" userId="c30a2a5e-a625-4fe5-91bb-6ef716ed15a4" providerId="ADAL" clId="{289FFF1B-0DC0-4ED9-99C7-E62FD8B7898E}" dt="2021-11-12T03:15:03.593" v="571" actId="20577"/>
+        <pc:sldMkLst>
+          <pc:docMk/>
+          <pc:sldMk cId="1070393926" sldId="257"/>
+        </pc:sldMkLst>
+        <pc:spChg chg="del">
+          <ac:chgData name="Thomas Stuart" userId="c30a2a5e-a625-4fe5-91bb-6ef716ed15a4" providerId="ADAL" clId="{289FFF1B-0DC0-4ED9-99C7-E62FD8B7898E}" dt="2021-11-12T01:08:44.455" v="2" actId="478"/>
+          <ac:spMkLst>
+            <pc:docMk/>
+            <pc:sldMk cId="1070393926" sldId="257"/>
+            <ac:spMk id="2" creationId="{1B54768D-E040-4C5A-A850-CA0503145F7A}"/>
+          </ac:spMkLst>
+        </pc:spChg>
+        <pc:spChg chg="del">
+          <ac:chgData name="Thomas Stuart" userId="c30a2a5e-a625-4fe5-91bb-6ef716ed15a4" providerId="ADAL" clId="{289FFF1B-0DC0-4ED9-99C7-E62FD8B7898E}" dt="2021-11-12T01:08:41.674" v="1" actId="478"/>
+          <ac:spMkLst>
+            <pc:docMk/>
+            <pc:sldMk cId="1070393926" sldId="257"/>
+            <ac:spMk id="3" creationId="{061D67C0-8D6A-4E55-B38F-EA67429983B8}"/>
+          </ac:spMkLst>
+        </pc:spChg>
+        <pc:spChg chg="add mod">
+          <ac:chgData name="Thomas Stuart" userId="c30a2a5e-a625-4fe5-91bb-6ef716ed15a4" providerId="ADAL" clId="{289FFF1B-0DC0-4ED9-99C7-E62FD8B7898E}" dt="2021-11-12T02:06:09.121" v="566" actId="164"/>
+          <ac:spMkLst>
+            <pc:docMk/>
+            <pc:sldMk cId="1070393926" sldId="257"/>
+            <ac:spMk id="4" creationId="{A8A92654-B1D8-42A1-9806-18E37BB29450}"/>
+          </ac:spMkLst>
+        </pc:spChg>
+        <pc:spChg chg="add mod">
+          <ac:chgData name="Thomas Stuart" userId="c30a2a5e-a625-4fe5-91bb-6ef716ed15a4" providerId="ADAL" clId="{289FFF1B-0DC0-4ED9-99C7-E62FD8B7898E}" dt="2021-11-12T02:06:09.121" v="566" actId="164"/>
+          <ac:spMkLst>
+            <pc:docMk/>
+            <pc:sldMk cId="1070393926" sldId="257"/>
+            <ac:spMk id="5" creationId="{F06D11FA-CDB6-4AEA-9AB4-464177E412E2}"/>
+          </ac:spMkLst>
+        </pc:spChg>
+        <pc:spChg chg="add mod">
+          <ac:chgData name="Thomas Stuart" userId="c30a2a5e-a625-4fe5-91bb-6ef716ed15a4" providerId="ADAL" clId="{289FFF1B-0DC0-4ED9-99C7-E62FD8B7898E}" dt="2021-11-12T02:06:09.121" v="566" actId="164"/>
+          <ac:spMkLst>
+            <pc:docMk/>
+            <pc:sldMk cId="1070393926" sldId="257"/>
+            <ac:spMk id="6" creationId="{4333D01C-B3A7-45C0-9B5E-DC18C604D78E}"/>
+          </ac:spMkLst>
+        </pc:spChg>
+        <pc:spChg chg="add mod">
+          <ac:chgData name="Thomas Stuart" userId="c30a2a5e-a625-4fe5-91bb-6ef716ed15a4" providerId="ADAL" clId="{289FFF1B-0DC0-4ED9-99C7-E62FD8B7898E}" dt="2021-11-12T02:06:09.121" v="566" actId="164"/>
+          <ac:spMkLst>
+            <pc:docMk/>
+            <pc:sldMk cId="1070393926" sldId="257"/>
+            <ac:spMk id="7" creationId="{DB609211-270A-4B10-9AF1-0F949492BEF2}"/>
+          </ac:spMkLst>
+        </pc:spChg>
+        <pc:spChg chg="add mod">
+          <ac:chgData name="Thomas Stuart" userId="c30a2a5e-a625-4fe5-91bb-6ef716ed15a4" providerId="ADAL" clId="{289FFF1B-0DC0-4ED9-99C7-E62FD8B7898E}" dt="2021-11-12T03:15:03.593" v="571" actId="20577"/>
+          <ac:spMkLst>
+            <pc:docMk/>
+            <pc:sldMk cId="1070393926" sldId="257"/>
+            <ac:spMk id="8" creationId="{33C194CF-4C60-4A42-B05B-CF69CEB80BE2}"/>
+          </ac:spMkLst>
+        </pc:spChg>
+        <pc:spChg chg="add mod">
+          <ac:chgData name="Thomas Stuart" userId="c30a2a5e-a625-4fe5-91bb-6ef716ed15a4" providerId="ADAL" clId="{289FFF1B-0DC0-4ED9-99C7-E62FD8B7898E}" dt="2021-11-12T02:06:09.121" v="566" actId="164"/>
+          <ac:spMkLst>
+            <pc:docMk/>
+            <pc:sldMk cId="1070393926" sldId="257"/>
+            <ac:spMk id="9" creationId="{939140ED-A067-4BEB-A28D-98CC473F439F}"/>
+          </ac:spMkLst>
+        </pc:spChg>
+        <pc:spChg chg="add mod">
+          <ac:chgData name="Thomas Stuart" userId="c30a2a5e-a625-4fe5-91bb-6ef716ed15a4" providerId="ADAL" clId="{289FFF1B-0DC0-4ED9-99C7-E62FD8B7898E}" dt="2021-11-12T02:06:09.121" v="566" actId="164"/>
+          <ac:spMkLst>
+            <pc:docMk/>
+            <pc:sldMk cId="1070393926" sldId="257"/>
+            <ac:spMk id="10" creationId="{E2C493BB-3497-4ED1-AC35-55A858C8C15C}"/>
+          </ac:spMkLst>
+        </pc:spChg>
+        <pc:spChg chg="add del">
+          <ac:chgData name="Thomas Stuart" userId="c30a2a5e-a625-4fe5-91bb-6ef716ed15a4" providerId="ADAL" clId="{289FFF1B-0DC0-4ED9-99C7-E62FD8B7898E}" dt="2021-11-12T01:13:30.104" v="193" actId="478"/>
+          <ac:spMkLst>
+            <pc:docMk/>
+            <pc:sldMk cId="1070393926" sldId="257"/>
+            <ac:spMk id="26" creationId="{96D050E5-7A43-4468-AD1B-469292401CF6}"/>
+          </ac:spMkLst>
+        </pc:spChg>
+        <pc:spChg chg="add del mod">
+          <ac:chgData name="Thomas Stuart" userId="c30a2a5e-a625-4fe5-91bb-6ef716ed15a4" providerId="ADAL" clId="{289FFF1B-0DC0-4ED9-99C7-E62FD8B7898E}" dt="2021-11-12T01:30:28.968" v="435" actId="478"/>
+          <ac:spMkLst>
+            <pc:docMk/>
+            <pc:sldMk cId="1070393926" sldId="257"/>
+            <ac:spMk id="27" creationId="{86E93BFF-483D-476E-8DE9-1DE69A0E2ADB}"/>
+          </ac:spMkLst>
+        </pc:spChg>
+        <pc:spChg chg="add del mod">
+          <ac:chgData name="Thomas Stuart" userId="c30a2a5e-a625-4fe5-91bb-6ef716ed15a4" providerId="ADAL" clId="{289FFF1B-0DC0-4ED9-99C7-E62FD8B7898E}" dt="2021-11-12T01:27:23.999" v="403" actId="478"/>
+          <ac:spMkLst>
+            <pc:docMk/>
+            <pc:sldMk cId="1070393926" sldId="257"/>
+            <ac:spMk id="28" creationId="{42CB66BA-2AB3-48BB-A468-57CCE360B416}"/>
+          </ac:spMkLst>
+        </pc:spChg>
+        <pc:spChg chg="add del mod">
+          <ac:chgData name="Thomas Stuart" userId="c30a2a5e-a625-4fe5-91bb-6ef716ed15a4" providerId="ADAL" clId="{289FFF1B-0DC0-4ED9-99C7-E62FD8B7898E}" dt="2021-11-12T02:26:00.309" v="569" actId="478"/>
+          <ac:spMkLst>
+            <pc:docMk/>
+            <pc:sldMk cId="1070393926" sldId="257"/>
+            <ac:spMk id="31" creationId="{4F80B1AE-7CFB-4F91-96D0-9EA0E260F939}"/>
+          </ac:spMkLst>
+        </pc:spChg>
+        <pc:spChg chg="add del mod">
+          <ac:chgData name="Thomas Stuart" userId="c30a2a5e-a625-4fe5-91bb-6ef716ed15a4" providerId="ADAL" clId="{289FFF1B-0DC0-4ED9-99C7-E62FD8B7898E}" dt="2021-11-12T01:23:02.287" v="225" actId="478"/>
+          <ac:spMkLst>
+            <pc:docMk/>
+            <pc:sldMk cId="1070393926" sldId="257"/>
+            <ac:spMk id="49" creationId="{194308C3-B6F5-4396-A0FC-A88020303297}"/>
+          </ac:spMkLst>
+        </pc:spChg>
+        <pc:spChg chg="add del mod">
+          <ac:chgData name="Thomas Stuart" userId="c30a2a5e-a625-4fe5-91bb-6ef716ed15a4" providerId="ADAL" clId="{289FFF1B-0DC0-4ED9-99C7-E62FD8B7898E}" dt="2021-11-12T01:23:01.262" v="224" actId="478"/>
+          <ac:spMkLst>
+            <pc:docMk/>
+            <pc:sldMk cId="1070393926" sldId="257"/>
+            <ac:spMk id="51" creationId="{1E0CA7E4-9465-43B4-9DCC-B7F6B71DF96C}"/>
+          </ac:spMkLst>
+        </pc:spChg>
+        <pc:spChg chg="add del mod">
+          <ac:chgData name="Thomas Stuart" userId="c30a2a5e-a625-4fe5-91bb-6ef716ed15a4" providerId="ADAL" clId="{289FFF1B-0DC0-4ED9-99C7-E62FD8B7898E}" dt="2021-11-12T01:28:10.471" v="418" actId="478"/>
+          <ac:spMkLst>
+            <pc:docMk/>
+            <pc:sldMk cId="1070393926" sldId="257"/>
+            <ac:spMk id="62" creationId="{173C0980-F09C-493D-B52E-DF9892DD41F3}"/>
+          </ac:spMkLst>
+        </pc:spChg>
+        <pc:spChg chg="add mod">
+          <ac:chgData name="Thomas Stuart" userId="c30a2a5e-a625-4fe5-91bb-6ef716ed15a4" providerId="ADAL" clId="{289FFF1B-0DC0-4ED9-99C7-E62FD8B7898E}" dt="2021-11-12T02:06:09.121" v="566" actId="164"/>
+          <ac:spMkLst>
+            <pc:docMk/>
+            <pc:sldMk cId="1070393926" sldId="257"/>
+            <ac:spMk id="63" creationId="{E01D2A66-D6B5-4705-A4F9-4AFB5EA159B9}"/>
+          </ac:spMkLst>
+        </pc:spChg>
+        <pc:spChg chg="add mod">
+          <ac:chgData name="Thomas Stuart" userId="c30a2a5e-a625-4fe5-91bb-6ef716ed15a4" providerId="ADAL" clId="{289FFF1B-0DC0-4ED9-99C7-E62FD8B7898E}" dt="2021-11-12T02:06:09.121" v="566" actId="164"/>
+          <ac:spMkLst>
+            <pc:docMk/>
+            <pc:sldMk cId="1070393926" sldId="257"/>
+            <ac:spMk id="64" creationId="{05F515A2-1781-443E-9104-2E5B061E4575}"/>
+          </ac:spMkLst>
+        </pc:spChg>
+        <pc:spChg chg="add mod">
+          <ac:chgData name="Thomas Stuart" userId="c30a2a5e-a625-4fe5-91bb-6ef716ed15a4" providerId="ADAL" clId="{289FFF1B-0DC0-4ED9-99C7-E62FD8B7898E}" dt="2021-11-12T02:06:09.121" v="566" actId="164"/>
+          <ac:spMkLst>
+            <pc:docMk/>
+            <pc:sldMk cId="1070393926" sldId="257"/>
+            <ac:spMk id="65" creationId="{5CDEFD57-A624-48D0-A3EA-8DD31419AAF2}"/>
+          </ac:spMkLst>
+        </pc:spChg>
+        <pc:spChg chg="add mod">
+          <ac:chgData name="Thomas Stuart" userId="c30a2a5e-a625-4fe5-91bb-6ef716ed15a4" providerId="ADAL" clId="{289FFF1B-0DC0-4ED9-99C7-E62FD8B7898E}" dt="2021-11-12T02:06:09.121" v="566" actId="164"/>
+          <ac:spMkLst>
+            <pc:docMk/>
+            <pc:sldMk cId="1070393926" sldId="257"/>
+            <ac:spMk id="66" creationId="{F7FB3522-E6D1-4257-AF95-C96F8AFF478F}"/>
+          </ac:spMkLst>
+        </pc:spChg>
+        <pc:spChg chg="add mod">
+          <ac:chgData name="Thomas Stuart" userId="c30a2a5e-a625-4fe5-91bb-6ef716ed15a4" providerId="ADAL" clId="{289FFF1B-0DC0-4ED9-99C7-E62FD8B7898E}" dt="2021-11-12T02:06:09.121" v="566" actId="164"/>
+          <ac:spMkLst>
+            <pc:docMk/>
+            <pc:sldMk cId="1070393926" sldId="257"/>
+            <ac:spMk id="70" creationId="{B3CC5F49-9997-4388-BF44-C0547C5E89BE}"/>
+          </ac:spMkLst>
+        </pc:spChg>
+        <pc:spChg chg="add del mod">
+          <ac:chgData name="Thomas Stuart" userId="c30a2a5e-a625-4fe5-91bb-6ef716ed15a4" providerId="ADAL" clId="{289FFF1B-0DC0-4ED9-99C7-E62FD8B7898E}" dt="2021-11-12T01:31:48.496" v="446" actId="478"/>
+          <ac:spMkLst>
+            <pc:docMk/>
+            <pc:sldMk cId="1070393926" sldId="257"/>
+            <ac:spMk id="71" creationId="{C8B24773-301D-45D2-BDD4-8BA5789F808A}"/>
+          </ac:spMkLst>
+        </pc:spChg>
+        <pc:spChg chg="add mod">
+          <ac:chgData name="Thomas Stuart" userId="c30a2a5e-a625-4fe5-91bb-6ef716ed15a4" providerId="ADAL" clId="{289FFF1B-0DC0-4ED9-99C7-E62FD8B7898E}" dt="2021-11-12T02:06:09.121" v="566" actId="164"/>
+          <ac:spMkLst>
+            <pc:docMk/>
+            <pc:sldMk cId="1070393926" sldId="257"/>
+            <ac:spMk id="74" creationId="{DFAC674C-EB5A-4129-A103-326C23BE7940}"/>
+          </ac:spMkLst>
+        </pc:spChg>
+        <pc:spChg chg="add mod">
+          <ac:chgData name="Thomas Stuart" userId="c30a2a5e-a625-4fe5-91bb-6ef716ed15a4" providerId="ADAL" clId="{289FFF1B-0DC0-4ED9-99C7-E62FD8B7898E}" dt="2021-11-12T02:06:09.121" v="566" actId="164"/>
+          <ac:spMkLst>
+            <pc:docMk/>
+            <pc:sldMk cId="1070393926" sldId="257"/>
+            <ac:spMk id="75" creationId="{C74760B5-8613-444A-871C-1BAFC308C874}"/>
+          </ac:spMkLst>
+        </pc:spChg>
+        <pc:spChg chg="add mod">
+          <ac:chgData name="Thomas Stuart" userId="c30a2a5e-a625-4fe5-91bb-6ef716ed15a4" providerId="ADAL" clId="{289FFF1B-0DC0-4ED9-99C7-E62FD8B7898E}" dt="2021-11-12T02:06:09.121" v="566" actId="164"/>
+          <ac:spMkLst>
+            <pc:docMk/>
+            <pc:sldMk cId="1070393926" sldId="257"/>
+            <ac:spMk id="76" creationId="{C0144458-D844-475B-A335-ED60CB90E42F}"/>
+          </ac:spMkLst>
+        </pc:spChg>
+        <pc:spChg chg="add mod">
+          <ac:chgData name="Thomas Stuart" userId="c30a2a5e-a625-4fe5-91bb-6ef716ed15a4" providerId="ADAL" clId="{289FFF1B-0DC0-4ED9-99C7-E62FD8B7898E}" dt="2021-11-12T02:06:09.121" v="566" actId="164"/>
+          <ac:spMkLst>
+            <pc:docMk/>
+            <pc:sldMk cId="1070393926" sldId="257"/>
+            <ac:spMk id="77" creationId="{FF95B563-5830-490E-B99C-16828EA999C6}"/>
+          </ac:spMkLst>
+        </pc:spChg>
+        <pc:spChg chg="add mod">
+          <ac:chgData name="Thomas Stuart" userId="c30a2a5e-a625-4fe5-91bb-6ef716ed15a4" providerId="ADAL" clId="{289FFF1B-0DC0-4ED9-99C7-E62FD8B7898E}" dt="2021-11-12T02:06:09.121" v="566" actId="164"/>
+          <ac:spMkLst>
+            <pc:docMk/>
+            <pc:sldMk cId="1070393926" sldId="257"/>
+            <ac:spMk id="78" creationId="{EE719C06-C54B-4F69-ADC3-3F2F3E2F5EB6}"/>
+          </ac:spMkLst>
+        </pc:spChg>
+        <pc:grpChg chg="add mod">
+          <ac:chgData name="Thomas Stuart" userId="c30a2a5e-a625-4fe5-91bb-6ef716ed15a4" providerId="ADAL" clId="{289FFF1B-0DC0-4ED9-99C7-E62FD8B7898E}" dt="2021-11-12T02:06:09.121" v="566" actId="164"/>
+          <ac:grpSpMkLst>
+            <pc:docMk/>
+            <pc:sldMk cId="1070393926" sldId="257"/>
+            <ac:grpSpMk id="2" creationId="{29F44142-00DE-420A-92C5-CF7E986A1F17}"/>
+          </ac:grpSpMkLst>
+        </pc:grpChg>
+        <pc:cxnChg chg="add mod">
+          <ac:chgData name="Thomas Stuart" userId="c30a2a5e-a625-4fe5-91bb-6ef716ed15a4" providerId="ADAL" clId="{289FFF1B-0DC0-4ED9-99C7-E62FD8B7898E}" dt="2021-11-12T02:06:09.121" v="566" actId="164"/>
+          <ac:cxnSpMkLst>
+            <pc:docMk/>
+            <pc:sldMk cId="1070393926" sldId="257"/>
+            <ac:cxnSpMk id="12" creationId="{399C5652-4281-40D5-BA57-9245E5920D26}"/>
+          </ac:cxnSpMkLst>
+        </pc:cxnChg>
+        <pc:cxnChg chg="add mod">
+          <ac:chgData name="Thomas Stuart" userId="c30a2a5e-a625-4fe5-91bb-6ef716ed15a4" providerId="ADAL" clId="{289FFF1B-0DC0-4ED9-99C7-E62FD8B7898E}" dt="2021-11-12T02:06:09.121" v="566" actId="164"/>
+          <ac:cxnSpMkLst>
+            <pc:docMk/>
+            <pc:sldMk cId="1070393926" sldId="257"/>
+            <ac:cxnSpMk id="13" creationId="{0B7A34C3-0B6A-4496-BFE0-C0DF99464932}"/>
+          </ac:cxnSpMkLst>
+        </pc:cxnChg>
+        <pc:cxnChg chg="add mod">
+          <ac:chgData name="Thomas Stuart" userId="c30a2a5e-a625-4fe5-91bb-6ef716ed15a4" providerId="ADAL" clId="{289FFF1B-0DC0-4ED9-99C7-E62FD8B7898E}" dt="2021-11-12T02:06:09.121" v="566" actId="164"/>
+          <ac:cxnSpMkLst>
+            <pc:docMk/>
+            <pc:sldMk cId="1070393926" sldId="257"/>
+            <ac:cxnSpMk id="16" creationId="{F133D95E-0315-45D8-8579-969BEAD155CB}"/>
+          </ac:cxnSpMkLst>
+        </pc:cxnChg>
+        <pc:cxnChg chg="add mod">
+          <ac:chgData name="Thomas Stuart" userId="c30a2a5e-a625-4fe5-91bb-6ef716ed15a4" providerId="ADAL" clId="{289FFF1B-0DC0-4ED9-99C7-E62FD8B7898E}" dt="2021-11-12T02:06:09.121" v="566" actId="164"/>
+          <ac:cxnSpMkLst>
+            <pc:docMk/>
+            <pc:sldMk cId="1070393926" sldId="257"/>
+            <ac:cxnSpMk id="20" creationId="{A1C5485D-7078-4B72-887C-CAF372288B9C}"/>
+          </ac:cxnSpMkLst>
+        </pc:cxnChg>
+        <pc:cxnChg chg="add mod">
+          <ac:chgData name="Thomas Stuart" userId="c30a2a5e-a625-4fe5-91bb-6ef716ed15a4" providerId="ADAL" clId="{289FFF1B-0DC0-4ED9-99C7-E62FD8B7898E}" dt="2021-11-12T02:06:09.121" v="566" actId="164"/>
+          <ac:cxnSpMkLst>
+            <pc:docMk/>
+            <pc:sldMk cId="1070393926" sldId="257"/>
+            <ac:cxnSpMk id="24" creationId="{1827E7BA-4388-4C26-A34A-D04C228A3805}"/>
+          </ac:cxnSpMkLst>
+        </pc:cxnChg>
+        <pc:cxnChg chg="add mod">
+          <ac:chgData name="Thomas Stuart" userId="c30a2a5e-a625-4fe5-91bb-6ef716ed15a4" providerId="ADAL" clId="{289FFF1B-0DC0-4ED9-99C7-E62FD8B7898E}" dt="2021-11-12T02:06:09.121" v="566" actId="164"/>
+          <ac:cxnSpMkLst>
+            <pc:docMk/>
+            <pc:sldMk cId="1070393926" sldId="257"/>
+            <ac:cxnSpMk id="30" creationId="{C8F28EA7-D235-4C85-B572-146E03380562}"/>
+          </ac:cxnSpMkLst>
+        </pc:cxnChg>
+        <pc:cxnChg chg="add mod">
+          <ac:chgData name="Thomas Stuart" userId="c30a2a5e-a625-4fe5-91bb-6ef716ed15a4" providerId="ADAL" clId="{289FFF1B-0DC0-4ED9-99C7-E62FD8B7898E}" dt="2021-11-12T02:06:09.121" v="566" actId="164"/>
+          <ac:cxnSpMkLst>
+            <pc:docMk/>
+            <pc:sldMk cId="1070393926" sldId="257"/>
+            <ac:cxnSpMk id="32" creationId="{E06E2927-3A97-4C45-B30C-038BD6D82274}"/>
+          </ac:cxnSpMkLst>
+        </pc:cxnChg>
+        <pc:cxnChg chg="add del mod">
+          <ac:chgData name="Thomas Stuart" userId="c30a2a5e-a625-4fe5-91bb-6ef716ed15a4" providerId="ADAL" clId="{289FFF1B-0DC0-4ED9-99C7-E62FD8B7898E}" dt="2021-11-12T01:27:26.351" v="406" actId="478"/>
+          <ac:cxnSpMkLst>
+            <pc:docMk/>
+            <pc:sldMk cId="1070393926" sldId="257"/>
+            <ac:cxnSpMk id="34" creationId="{C40D8806-616D-4909-927B-C219BEC01A5D}"/>
+          </ac:cxnSpMkLst>
+        </pc:cxnChg>
+        <pc:cxnChg chg="add del mod">
+          <ac:chgData name="Thomas Stuart" userId="c30a2a5e-a625-4fe5-91bb-6ef716ed15a4" providerId="ADAL" clId="{289FFF1B-0DC0-4ED9-99C7-E62FD8B7898E}" dt="2021-11-12T01:27:27.159" v="407" actId="478"/>
+          <ac:cxnSpMkLst>
+            <pc:docMk/>
+            <pc:sldMk cId="1070393926" sldId="257"/>
+            <ac:cxnSpMk id="36" creationId="{77FDF74C-18C2-4A41-93A6-539DAF5288B0}"/>
+          </ac:cxnSpMkLst>
+        </pc:cxnChg>
+        <pc:cxnChg chg="add del mod">
+          <ac:chgData name="Thomas Stuart" userId="c30a2a5e-a625-4fe5-91bb-6ef716ed15a4" providerId="ADAL" clId="{289FFF1B-0DC0-4ED9-99C7-E62FD8B7898E}" dt="2021-11-12T01:27:25.879" v="405" actId="478"/>
+          <ac:cxnSpMkLst>
+            <pc:docMk/>
+            <pc:sldMk cId="1070393926" sldId="257"/>
+            <ac:cxnSpMk id="38" creationId="{29070854-E2A8-48B8-A873-B804BE648445}"/>
+          </ac:cxnSpMkLst>
+        </pc:cxnChg>
+        <pc:cxnChg chg="add del mod">
+          <ac:chgData name="Thomas Stuart" userId="c30a2a5e-a625-4fe5-91bb-6ef716ed15a4" providerId="ADAL" clId="{289FFF1B-0DC0-4ED9-99C7-E62FD8B7898E}" dt="2021-11-12T01:27:24.831" v="404" actId="478"/>
+          <ac:cxnSpMkLst>
+            <pc:docMk/>
+            <pc:sldMk cId="1070393926" sldId="257"/>
+            <ac:cxnSpMk id="40" creationId="{CE593FAC-D2A4-487C-B844-37686212B931}"/>
+          </ac:cxnSpMkLst>
+        </pc:cxnChg>
+        <pc:cxnChg chg="add mod">
+          <ac:chgData name="Thomas Stuart" userId="c30a2a5e-a625-4fe5-91bb-6ef716ed15a4" providerId="ADAL" clId="{289FFF1B-0DC0-4ED9-99C7-E62FD8B7898E}" dt="2021-11-12T02:06:09.121" v="566" actId="164"/>
+          <ac:cxnSpMkLst>
+            <pc:docMk/>
+            <pc:sldMk cId="1070393926" sldId="257"/>
+            <ac:cxnSpMk id="42" creationId="{7607FE7A-3739-480F-AE01-9C9CB3574BFC}"/>
+          </ac:cxnSpMkLst>
+        </pc:cxnChg>
+        <pc:cxnChg chg="add mod">
+          <ac:chgData name="Thomas Stuart" userId="c30a2a5e-a625-4fe5-91bb-6ef716ed15a4" providerId="ADAL" clId="{289FFF1B-0DC0-4ED9-99C7-E62FD8B7898E}" dt="2021-11-12T02:06:09.121" v="566" actId="164"/>
+          <ac:cxnSpMkLst>
+            <pc:docMk/>
+            <pc:sldMk cId="1070393926" sldId="257"/>
+            <ac:cxnSpMk id="44" creationId="{A7B8B0FB-CEC8-4901-AB9E-2A2BAE96FB26}"/>
+          </ac:cxnSpMkLst>
+        </pc:cxnChg>
+        <pc:cxnChg chg="add del mod">
+          <ac:chgData name="Thomas Stuart" userId="c30a2a5e-a625-4fe5-91bb-6ef716ed15a4" providerId="ADAL" clId="{289FFF1B-0DC0-4ED9-99C7-E62FD8B7898E}" dt="2021-11-12T01:23:00.223" v="223" actId="478"/>
+          <ac:cxnSpMkLst>
+            <pc:docMk/>
+            <pc:sldMk cId="1070393926" sldId="257"/>
+            <ac:cxnSpMk id="53" creationId="{A9350146-1E3F-4B26-9537-A2B0B374F83C}"/>
+          </ac:cxnSpMkLst>
+        </pc:cxnChg>
+        <pc:cxnChg chg="add del mod">
+          <ac:chgData name="Thomas Stuart" userId="c30a2a5e-a625-4fe5-91bb-6ef716ed15a4" providerId="ADAL" clId="{289FFF1B-0DC0-4ED9-99C7-E62FD8B7898E}" dt="2021-11-12T01:30:27.688" v="434" actId="478"/>
+          <ac:cxnSpMkLst>
+            <pc:docMk/>
+            <pc:sldMk cId="1070393926" sldId="257"/>
+            <ac:cxnSpMk id="56" creationId="{D8F91D1C-4AD3-47E8-BFBB-D0C863A17A9F}"/>
+          </ac:cxnSpMkLst>
+        </pc:cxnChg>
+        <pc:cxnChg chg="add del mod">
+          <ac:chgData name="Thomas Stuart" userId="c30a2a5e-a625-4fe5-91bb-6ef716ed15a4" providerId="ADAL" clId="{289FFF1B-0DC0-4ED9-99C7-E62FD8B7898E}" dt="2021-11-12T01:30:26.776" v="433" actId="478"/>
+          <ac:cxnSpMkLst>
+            <pc:docMk/>
+            <pc:sldMk cId="1070393926" sldId="257"/>
+            <ac:cxnSpMk id="58" creationId="{98470C5A-F9F0-4711-AFA8-6BF3BB9B44ED}"/>
+          </ac:cxnSpMkLst>
+        </pc:cxnChg>
+        <pc:cxnChg chg="add del mod">
+          <ac:chgData name="Thomas Stuart" userId="c30a2a5e-a625-4fe5-91bb-6ef716ed15a4" providerId="ADAL" clId="{289FFF1B-0DC0-4ED9-99C7-E62FD8B7898E}" dt="2021-11-12T01:27:56.718" v="413" actId="478"/>
+          <ac:cxnSpMkLst>
+            <pc:docMk/>
+            <pc:sldMk cId="1070393926" sldId="257"/>
+            <ac:cxnSpMk id="60" creationId="{7B6DDED3-8CD1-4BEB-A8C6-1370D3A564DE}"/>
+          </ac:cxnSpMkLst>
+        </pc:cxnChg>
+        <pc:cxnChg chg="add mod">
+          <ac:chgData name="Thomas Stuart" userId="c30a2a5e-a625-4fe5-91bb-6ef716ed15a4" providerId="ADAL" clId="{289FFF1B-0DC0-4ED9-99C7-E62FD8B7898E}" dt="2021-11-12T02:06:09.121" v="566" actId="164"/>
+          <ac:cxnSpMkLst>
+            <pc:docMk/>
+            <pc:sldMk cId="1070393926" sldId="257"/>
+            <ac:cxnSpMk id="61" creationId="{95D7450E-1402-49FF-AD32-60CB96ADA7C5}"/>
+          </ac:cxnSpMkLst>
+        </pc:cxnChg>
+        <pc:cxnChg chg="add mod">
+          <ac:chgData name="Thomas Stuart" userId="c30a2a5e-a625-4fe5-91bb-6ef716ed15a4" providerId="ADAL" clId="{289FFF1B-0DC0-4ED9-99C7-E62FD8B7898E}" dt="2021-11-12T02:06:09.121" v="566" actId="164"/>
+          <ac:cxnSpMkLst>
+            <pc:docMk/>
+            <pc:sldMk cId="1070393926" sldId="257"/>
+            <ac:cxnSpMk id="68" creationId="{F193A147-1F98-4287-871F-FAAD1B72E347}"/>
+          </ac:cxnSpMkLst>
+        </pc:cxnChg>
+      </pc:sldChg>
+    </pc:docChg>
+  </pc:docChgLst>
+</pc:chgInfo>
 </file>
 
 <file path=ppt/slideLayouts/slideLayout1.xml><?xml version="1.0" encoding="utf-8"?>
@@ -254,7 +657,7 @@
           <a:p>
             <a:fld id="{B4208711-226E-4296-B630-B65121974DC1}" type="datetimeFigureOut">
               <a:rPr lang="en-US" smtClean="0"/>
-              <a:t>11/10/2021</a:t>
+              <a:t>11/11/2021</a:t>
             </a:fld>
             <a:endParaRPr lang="en-US"/>
           </a:p>
@@ -452,7 +855,7 @@
           <a:p>
             <a:fld id="{B4208711-226E-4296-B630-B65121974DC1}" type="datetimeFigureOut">
               <a:rPr lang="en-US" smtClean="0"/>
-              <a:t>11/10/2021</a:t>
+              <a:t>11/11/2021</a:t>
             </a:fld>
             <a:endParaRPr lang="en-US"/>
           </a:p>
@@ -660,7 +1063,7 @@
           <a:p>
             <a:fld id="{B4208711-226E-4296-B630-B65121974DC1}" type="datetimeFigureOut">
               <a:rPr lang="en-US" smtClean="0"/>
-              <a:t>11/10/2021</a:t>
+              <a:t>11/11/2021</a:t>
             </a:fld>
             <a:endParaRPr lang="en-US"/>
           </a:p>
@@ -858,7 +1261,7 @@
           <a:p>
             <a:fld id="{B4208711-226E-4296-B630-B65121974DC1}" type="datetimeFigureOut">
               <a:rPr lang="en-US" smtClean="0"/>
-              <a:t>11/10/2021</a:t>
+              <a:t>11/11/2021</a:t>
             </a:fld>
             <a:endParaRPr lang="en-US"/>
           </a:p>
@@ -1133,7 +1536,7 @@
           <a:p>
             <a:fld id="{B4208711-226E-4296-B630-B65121974DC1}" type="datetimeFigureOut">
               <a:rPr lang="en-US" smtClean="0"/>
-              <a:t>11/10/2021</a:t>
+              <a:t>11/11/2021</a:t>
             </a:fld>
             <a:endParaRPr lang="en-US"/>
           </a:p>
@@ -1398,7 +1801,7 @@
           <a:p>
             <a:fld id="{B4208711-226E-4296-B630-B65121974DC1}" type="datetimeFigureOut">
               <a:rPr lang="en-US" smtClean="0"/>
-              <a:t>11/10/2021</a:t>
+              <a:t>11/11/2021</a:t>
             </a:fld>
             <a:endParaRPr lang="en-US"/>
           </a:p>
@@ -1810,7 +2213,7 @@
           <a:p>
             <a:fld id="{B4208711-226E-4296-B630-B65121974DC1}" type="datetimeFigureOut">
               <a:rPr lang="en-US" smtClean="0"/>
-              <a:t>11/10/2021</a:t>
+              <a:t>11/11/2021</a:t>
             </a:fld>
             <a:endParaRPr lang="en-US"/>
           </a:p>
@@ -1951,7 +2354,7 @@
           <a:p>
             <a:fld id="{B4208711-226E-4296-B630-B65121974DC1}" type="datetimeFigureOut">
               <a:rPr lang="en-US" smtClean="0"/>
-              <a:t>11/10/2021</a:t>
+              <a:t>11/11/2021</a:t>
             </a:fld>
             <a:endParaRPr lang="en-US"/>
           </a:p>
@@ -2064,7 +2467,7 @@
           <a:p>
             <a:fld id="{B4208711-226E-4296-B630-B65121974DC1}" type="datetimeFigureOut">
               <a:rPr lang="en-US" smtClean="0"/>
-              <a:t>11/10/2021</a:t>
+              <a:t>11/11/2021</a:t>
             </a:fld>
             <a:endParaRPr lang="en-US"/>
           </a:p>
@@ -2375,7 +2778,7 @@
           <a:p>
             <a:fld id="{B4208711-226E-4296-B630-B65121974DC1}" type="datetimeFigureOut">
               <a:rPr lang="en-US" smtClean="0"/>
-              <a:t>11/10/2021</a:t>
+              <a:t>11/11/2021</a:t>
             </a:fld>
             <a:endParaRPr lang="en-US"/>
           </a:p>
@@ -2663,7 +3066,7 @@
           <a:p>
             <a:fld id="{B4208711-226E-4296-B630-B65121974DC1}" type="datetimeFigureOut">
               <a:rPr lang="en-US" smtClean="0"/>
-              <a:t>11/10/2021</a:t>
+              <a:t>11/11/2021</a:t>
             </a:fld>
             <a:endParaRPr lang="en-US"/>
           </a:p>
@@ -2904,7 +3307,7 @@
           <a:p>
             <a:fld id="{B4208711-226E-4296-B630-B65121974DC1}" type="datetimeFigureOut">
               <a:rPr lang="en-US" smtClean="0"/>
-              <a:t>11/10/2021</a:t>
+              <a:t>11/11/2021</a:t>
             </a:fld>
             <a:endParaRPr lang="en-US"/>
           </a:p>
@@ -8510,6 +8913,1302 @@
 </p:sld>
 </file>
 
+<file path=ppt/slides/slide2.xml><?xml version="1.0" encoding="utf-8"?>
+<p:sld xmlns:a="http://schemas.openxmlformats.org/drawingml/2006/main" xmlns:r="http://schemas.openxmlformats.org/officeDocument/2006/relationships" xmlns:p="http://schemas.openxmlformats.org/presentationml/2006/main">
+  <p:cSld>
+    <p:spTree>
+      <p:nvGrpSpPr>
+        <p:cNvPr id="1" name=""/>
+        <p:cNvGrpSpPr/>
+        <p:nvPr/>
+      </p:nvGrpSpPr>
+      <p:grpSpPr>
+        <a:xfrm>
+          <a:off x="0" y="0"/>
+          <a:ext cx="0" cy="0"/>
+          <a:chOff x="0" y="0"/>
+          <a:chExt cx="0" cy="0"/>
+        </a:xfrm>
+      </p:grpSpPr>
+      <p:grpSp>
+        <p:nvGrpSpPr>
+          <p:cNvPr id="2" name="Group 1">
+            <a:extLst>
+              <a:ext uri="{FF2B5EF4-FFF2-40B4-BE49-F238E27FC236}">
+                <a16:creationId xmlns:a16="http://schemas.microsoft.com/office/drawing/2014/main" id="{29F44142-00DE-420A-92C5-CF7E986A1F17}"/>
+              </a:ext>
+            </a:extLst>
+          </p:cNvPr>
+          <p:cNvGrpSpPr/>
+          <p:nvPr/>
+        </p:nvGrpSpPr>
+        <p:grpSpPr>
+          <a:xfrm>
+            <a:off x="1069675" y="414068"/>
+            <a:ext cx="7008962" cy="3939397"/>
+            <a:chOff x="1069675" y="414068"/>
+            <a:chExt cx="7008962" cy="3939397"/>
+          </a:xfrm>
+        </p:grpSpPr>
+        <p:sp>
+          <p:nvSpPr>
+            <p:cNvPr id="4" name="Rectangle 3">
+              <a:extLst>
+                <a:ext uri="{FF2B5EF4-FFF2-40B4-BE49-F238E27FC236}">
+                  <a16:creationId xmlns:a16="http://schemas.microsoft.com/office/drawing/2014/main" id="{A8A92654-B1D8-42A1-9806-18E37BB29450}"/>
+                </a:ext>
+              </a:extLst>
+            </p:cNvPr>
+            <p:cNvSpPr/>
+            <p:nvPr/>
+          </p:nvSpPr>
+          <p:spPr>
+            <a:xfrm>
+              <a:off x="1613138" y="414068"/>
+              <a:ext cx="1302589" cy="750498"/>
+            </a:xfrm>
+            <a:prstGeom prst="rect">
+              <a:avLst/>
+            </a:prstGeom>
+            <a:noFill/>
+            <a:ln>
+              <a:solidFill>
+                <a:schemeClr val="tx1"/>
+              </a:solidFill>
+            </a:ln>
+          </p:spPr>
+          <p:style>
+            <a:lnRef idx="2">
+              <a:schemeClr val="accent1">
+                <a:shade val="50000"/>
+              </a:schemeClr>
+            </a:lnRef>
+            <a:fillRef idx="1">
+              <a:schemeClr val="accent1"/>
+            </a:fillRef>
+            <a:effectRef idx="0">
+              <a:schemeClr val="accent1"/>
+            </a:effectRef>
+            <a:fontRef idx="minor">
+              <a:schemeClr val="lt1"/>
+            </a:fontRef>
+          </p:style>
+          <p:txBody>
+            <a:bodyPr rtlCol="0" anchor="ctr"/>
+            <a:lstStyle/>
+            <a:p>
+              <a:pPr algn="ctr"/>
+              <a:r>
+                <a:rPr lang="en-US" sz="1400" dirty="0">
+                  <a:solidFill>
+                    <a:schemeClr val="tx1"/>
+                  </a:solidFill>
+                </a:rPr>
+                <a:t>Power Relay 1 (P1)</a:t>
+              </a:r>
+            </a:p>
+          </p:txBody>
+        </p:sp>
+        <p:sp>
+          <p:nvSpPr>
+            <p:cNvPr id="5" name="Rectangle 4">
+              <a:extLst>
+                <a:ext uri="{FF2B5EF4-FFF2-40B4-BE49-F238E27FC236}">
+                  <a16:creationId xmlns:a16="http://schemas.microsoft.com/office/drawing/2014/main" id="{F06D11FA-CDB6-4AEA-9AB4-464177E412E2}"/>
+                </a:ext>
+              </a:extLst>
+            </p:cNvPr>
+            <p:cNvSpPr/>
+            <p:nvPr/>
+          </p:nvSpPr>
+          <p:spPr>
+            <a:xfrm>
+              <a:off x="1613139" y="2007079"/>
+              <a:ext cx="1302589" cy="750498"/>
+            </a:xfrm>
+            <a:prstGeom prst="rect">
+              <a:avLst/>
+            </a:prstGeom>
+            <a:noFill/>
+            <a:ln>
+              <a:solidFill>
+                <a:schemeClr val="tx1"/>
+              </a:solidFill>
+            </a:ln>
+          </p:spPr>
+          <p:style>
+            <a:lnRef idx="2">
+              <a:schemeClr val="accent1">
+                <a:shade val="50000"/>
+              </a:schemeClr>
+            </a:lnRef>
+            <a:fillRef idx="1">
+              <a:schemeClr val="accent1"/>
+            </a:fillRef>
+            <a:effectRef idx="0">
+              <a:schemeClr val="accent1"/>
+            </a:effectRef>
+            <a:fontRef idx="minor">
+              <a:schemeClr val="lt1"/>
+            </a:fontRef>
+          </p:style>
+          <p:txBody>
+            <a:bodyPr rtlCol="0" anchor="ctr"/>
+            <a:lstStyle/>
+            <a:p>
+              <a:pPr algn="ctr"/>
+              <a:r>
+                <a:rPr lang="en-US" sz="1400" dirty="0">
+                  <a:solidFill>
+                    <a:schemeClr val="tx1"/>
+                  </a:solidFill>
+                </a:rPr>
+                <a:t>Power Relay 2 (P2)</a:t>
+              </a:r>
+            </a:p>
+          </p:txBody>
+        </p:sp>
+        <p:sp>
+          <p:nvSpPr>
+            <p:cNvPr id="6" name="Rectangle 5">
+              <a:extLst>
+                <a:ext uri="{FF2B5EF4-FFF2-40B4-BE49-F238E27FC236}">
+                  <a16:creationId xmlns:a16="http://schemas.microsoft.com/office/drawing/2014/main" id="{4333D01C-B3A7-45C0-9B5E-DC18C604D78E}"/>
+                </a:ext>
+              </a:extLst>
+            </p:cNvPr>
+            <p:cNvSpPr/>
+            <p:nvPr/>
+          </p:nvSpPr>
+          <p:spPr>
+            <a:xfrm>
+              <a:off x="1613138" y="3602967"/>
+              <a:ext cx="1302589" cy="750498"/>
+            </a:xfrm>
+            <a:prstGeom prst="rect">
+              <a:avLst/>
+            </a:prstGeom>
+            <a:noFill/>
+            <a:ln>
+              <a:solidFill>
+                <a:schemeClr val="tx1"/>
+              </a:solidFill>
+            </a:ln>
+          </p:spPr>
+          <p:style>
+            <a:lnRef idx="2">
+              <a:schemeClr val="accent1">
+                <a:shade val="50000"/>
+              </a:schemeClr>
+            </a:lnRef>
+            <a:fillRef idx="1">
+              <a:schemeClr val="accent1"/>
+            </a:fillRef>
+            <a:effectRef idx="0">
+              <a:schemeClr val="accent1"/>
+            </a:effectRef>
+            <a:fontRef idx="minor">
+              <a:schemeClr val="lt1"/>
+            </a:fontRef>
+          </p:style>
+          <p:txBody>
+            <a:bodyPr rtlCol="0" anchor="ctr"/>
+            <a:lstStyle/>
+            <a:p>
+              <a:pPr algn="ctr"/>
+              <a:r>
+                <a:rPr lang="en-US" sz="1400" dirty="0">
+                  <a:solidFill>
+                    <a:schemeClr val="tx1"/>
+                  </a:solidFill>
+                </a:rPr>
+                <a:t>Power Relay 3 (P3)</a:t>
+              </a:r>
+            </a:p>
+          </p:txBody>
+        </p:sp>
+        <p:sp>
+          <p:nvSpPr>
+            <p:cNvPr id="7" name="Rectangle 6">
+              <a:extLst>
+                <a:ext uri="{FF2B5EF4-FFF2-40B4-BE49-F238E27FC236}">
+                  <a16:creationId xmlns:a16="http://schemas.microsoft.com/office/drawing/2014/main" id="{DB609211-270A-4B10-9AF1-0F949492BEF2}"/>
+                </a:ext>
+              </a:extLst>
+            </p:cNvPr>
+            <p:cNvSpPr/>
+            <p:nvPr/>
+          </p:nvSpPr>
+          <p:spPr>
+            <a:xfrm>
+              <a:off x="4090360" y="1209135"/>
+              <a:ext cx="1302589" cy="750498"/>
+            </a:xfrm>
+            <a:prstGeom prst="rect">
+              <a:avLst/>
+            </a:prstGeom>
+            <a:noFill/>
+            <a:ln>
+              <a:solidFill>
+                <a:schemeClr val="tx1"/>
+              </a:solidFill>
+            </a:ln>
+          </p:spPr>
+          <p:style>
+            <a:lnRef idx="2">
+              <a:schemeClr val="accent1">
+                <a:shade val="50000"/>
+              </a:schemeClr>
+            </a:lnRef>
+            <a:fillRef idx="1">
+              <a:schemeClr val="accent1"/>
+            </a:fillRef>
+            <a:effectRef idx="0">
+              <a:schemeClr val="accent1"/>
+            </a:effectRef>
+            <a:fontRef idx="minor">
+              <a:schemeClr val="lt1"/>
+            </a:fontRef>
+          </p:style>
+          <p:txBody>
+            <a:bodyPr rtlCol="0" anchor="ctr"/>
+            <a:lstStyle/>
+            <a:p>
+              <a:pPr algn="ctr"/>
+              <a:r>
+                <a:rPr lang="en-US" sz="1400" dirty="0">
+                  <a:solidFill>
+                    <a:schemeClr val="tx1"/>
+                  </a:solidFill>
+                </a:rPr>
+                <a:t>Power Conditioning Unit 1 (PCU1)</a:t>
+              </a:r>
+            </a:p>
+          </p:txBody>
+        </p:sp>
+        <p:sp>
+          <p:nvSpPr>
+            <p:cNvPr id="8" name="Rectangle 7">
+              <a:extLst>
+                <a:ext uri="{FF2B5EF4-FFF2-40B4-BE49-F238E27FC236}">
+                  <a16:creationId xmlns:a16="http://schemas.microsoft.com/office/drawing/2014/main" id="{33C194CF-4C60-4A42-B05B-CF69CEB80BE2}"/>
+                </a:ext>
+              </a:extLst>
+            </p:cNvPr>
+            <p:cNvSpPr/>
+            <p:nvPr/>
+          </p:nvSpPr>
+          <p:spPr>
+            <a:xfrm>
+              <a:off x="4094663" y="2805023"/>
+              <a:ext cx="1302589" cy="750498"/>
+            </a:xfrm>
+            <a:prstGeom prst="rect">
+              <a:avLst/>
+            </a:prstGeom>
+            <a:noFill/>
+            <a:ln>
+              <a:solidFill>
+                <a:schemeClr val="tx1"/>
+              </a:solidFill>
+            </a:ln>
+          </p:spPr>
+          <p:style>
+            <a:lnRef idx="2">
+              <a:schemeClr val="accent1">
+                <a:shade val="50000"/>
+              </a:schemeClr>
+            </a:lnRef>
+            <a:fillRef idx="1">
+              <a:schemeClr val="accent1"/>
+            </a:fillRef>
+            <a:effectRef idx="0">
+              <a:schemeClr val="accent1"/>
+            </a:effectRef>
+            <a:fontRef idx="minor">
+              <a:schemeClr val="lt1"/>
+            </a:fontRef>
+          </p:style>
+          <p:txBody>
+            <a:bodyPr rtlCol="0" anchor="ctr"/>
+            <a:lstStyle/>
+            <a:p>
+              <a:pPr algn="ctr"/>
+              <a:r>
+                <a:rPr lang="en-US" sz="1400" dirty="0">
+                  <a:solidFill>
+                    <a:schemeClr val="tx1"/>
+                  </a:solidFill>
+                </a:rPr>
+                <a:t>Power Conditioning Unit 2 (PCU2)</a:t>
+              </a:r>
+            </a:p>
+          </p:txBody>
+        </p:sp>
+        <p:sp>
+          <p:nvSpPr>
+            <p:cNvPr id="9" name="Rectangle 8">
+              <a:extLst>
+                <a:ext uri="{FF2B5EF4-FFF2-40B4-BE49-F238E27FC236}">
+                  <a16:creationId xmlns:a16="http://schemas.microsoft.com/office/drawing/2014/main" id="{939140ED-A067-4BEB-A28D-98CC473F439F}"/>
+                </a:ext>
+              </a:extLst>
+            </p:cNvPr>
+            <p:cNvSpPr/>
+            <p:nvPr/>
+          </p:nvSpPr>
+          <p:spPr>
+            <a:xfrm>
+              <a:off x="6232585" y="1209135"/>
+              <a:ext cx="1302589" cy="750498"/>
+            </a:xfrm>
+            <a:prstGeom prst="rect">
+              <a:avLst/>
+            </a:prstGeom>
+            <a:noFill/>
+            <a:ln>
+              <a:solidFill>
+                <a:schemeClr val="tx1"/>
+              </a:solidFill>
+            </a:ln>
+          </p:spPr>
+          <p:style>
+            <a:lnRef idx="2">
+              <a:schemeClr val="accent1">
+                <a:shade val="50000"/>
+              </a:schemeClr>
+            </a:lnRef>
+            <a:fillRef idx="1">
+              <a:schemeClr val="accent1"/>
+            </a:fillRef>
+            <a:effectRef idx="0">
+              <a:schemeClr val="accent1"/>
+            </a:effectRef>
+            <a:fontRef idx="minor">
+              <a:schemeClr val="lt1"/>
+            </a:fontRef>
+          </p:style>
+          <p:txBody>
+            <a:bodyPr rtlCol="0" anchor="ctr"/>
+            <a:lstStyle/>
+            <a:p>
+              <a:pPr algn="ctr"/>
+              <a:r>
+                <a:rPr lang="en-US" sz="1400" dirty="0">
+                  <a:solidFill>
+                    <a:schemeClr val="tx1"/>
+                  </a:solidFill>
+                </a:rPr>
+                <a:t>IR Camera (C1)</a:t>
+              </a:r>
+            </a:p>
+          </p:txBody>
+        </p:sp>
+        <p:sp>
+          <p:nvSpPr>
+            <p:cNvPr id="10" name="Rectangle 9">
+              <a:extLst>
+                <a:ext uri="{FF2B5EF4-FFF2-40B4-BE49-F238E27FC236}">
+                  <a16:creationId xmlns:a16="http://schemas.microsoft.com/office/drawing/2014/main" id="{E2C493BB-3497-4ED1-AC35-55A858C8C15C}"/>
+                </a:ext>
+              </a:extLst>
+            </p:cNvPr>
+            <p:cNvSpPr/>
+            <p:nvPr/>
+          </p:nvSpPr>
+          <p:spPr>
+            <a:xfrm>
+              <a:off x="6232585" y="2805023"/>
+              <a:ext cx="1302589" cy="750498"/>
+            </a:xfrm>
+            <a:prstGeom prst="rect">
+              <a:avLst/>
+            </a:prstGeom>
+            <a:noFill/>
+            <a:ln>
+              <a:solidFill>
+                <a:schemeClr val="tx1"/>
+              </a:solidFill>
+            </a:ln>
+          </p:spPr>
+          <p:style>
+            <a:lnRef idx="2">
+              <a:schemeClr val="accent1">
+                <a:shade val="50000"/>
+              </a:schemeClr>
+            </a:lnRef>
+            <a:fillRef idx="1">
+              <a:schemeClr val="accent1"/>
+            </a:fillRef>
+            <a:effectRef idx="0">
+              <a:schemeClr val="accent1"/>
+            </a:effectRef>
+            <a:fontRef idx="minor">
+              <a:schemeClr val="lt1"/>
+            </a:fontRef>
+          </p:style>
+          <p:txBody>
+            <a:bodyPr rtlCol="0" anchor="ctr"/>
+            <a:lstStyle/>
+            <a:p>
+              <a:pPr algn="ctr"/>
+              <a:r>
+                <a:rPr lang="en-US" sz="1400" dirty="0">
+                  <a:solidFill>
+                    <a:schemeClr val="tx1"/>
+                  </a:solidFill>
+                </a:rPr>
+                <a:t>Visible Spectrum Camera (C2)</a:t>
+              </a:r>
+            </a:p>
+          </p:txBody>
+        </p:sp>
+        <p:cxnSp>
+          <p:nvCxnSpPr>
+            <p:cNvPr id="12" name="Connector: Elbow 11">
+              <a:extLst>
+                <a:ext uri="{FF2B5EF4-FFF2-40B4-BE49-F238E27FC236}">
+                  <a16:creationId xmlns:a16="http://schemas.microsoft.com/office/drawing/2014/main" id="{399C5652-4281-40D5-BA57-9245E5920D26}"/>
+                </a:ext>
+              </a:extLst>
+            </p:cNvPr>
+            <p:cNvCxnSpPr>
+              <a:stCxn id="4" idx="3"/>
+            </p:cNvCxnSpPr>
+            <p:nvPr/>
+          </p:nvCxnSpPr>
+          <p:spPr>
+            <a:xfrm>
+              <a:off x="2915727" y="789317"/>
+              <a:ext cx="1174633" cy="642668"/>
+            </a:xfrm>
+            <a:prstGeom prst="bentConnector3">
+              <a:avLst/>
+            </a:prstGeom>
+            <a:ln>
+              <a:solidFill>
+                <a:schemeClr val="tx1"/>
+              </a:solidFill>
+            </a:ln>
+          </p:spPr>
+          <p:style>
+            <a:lnRef idx="1">
+              <a:schemeClr val="accent1"/>
+            </a:lnRef>
+            <a:fillRef idx="0">
+              <a:schemeClr val="accent1"/>
+            </a:fillRef>
+            <a:effectRef idx="0">
+              <a:schemeClr val="accent1"/>
+            </a:effectRef>
+            <a:fontRef idx="minor">
+              <a:schemeClr val="tx1"/>
+            </a:fontRef>
+          </p:style>
+        </p:cxnSp>
+        <p:cxnSp>
+          <p:nvCxnSpPr>
+            <p:cNvPr id="13" name="Connector: Elbow 12">
+              <a:extLst>
+                <a:ext uri="{FF2B5EF4-FFF2-40B4-BE49-F238E27FC236}">
+                  <a16:creationId xmlns:a16="http://schemas.microsoft.com/office/drawing/2014/main" id="{0B7A34C3-0B6A-4496-BFE0-C0DF99464932}"/>
+                </a:ext>
+              </a:extLst>
+            </p:cNvPr>
+            <p:cNvCxnSpPr>
+              <a:cxnSpLocks/>
+              <a:stCxn id="6" idx="3"/>
+            </p:cNvCxnSpPr>
+            <p:nvPr/>
+          </p:nvCxnSpPr>
+          <p:spPr>
+            <a:xfrm flipV="1">
+              <a:off x="2915727" y="3332671"/>
+              <a:ext cx="1174633" cy="645545"/>
+            </a:xfrm>
+            <a:prstGeom prst="bentConnector3">
+              <a:avLst/>
+            </a:prstGeom>
+            <a:ln>
+              <a:solidFill>
+                <a:schemeClr val="tx1"/>
+              </a:solidFill>
+            </a:ln>
+          </p:spPr>
+          <p:style>
+            <a:lnRef idx="1">
+              <a:schemeClr val="accent1"/>
+            </a:lnRef>
+            <a:fillRef idx="0">
+              <a:schemeClr val="accent1"/>
+            </a:fillRef>
+            <a:effectRef idx="0">
+              <a:schemeClr val="accent1"/>
+            </a:effectRef>
+            <a:fontRef idx="minor">
+              <a:schemeClr val="tx1"/>
+            </a:fontRef>
+          </p:style>
+        </p:cxnSp>
+        <p:cxnSp>
+          <p:nvCxnSpPr>
+            <p:cNvPr id="16" name="Connector: Elbow 15">
+              <a:extLst>
+                <a:ext uri="{FF2B5EF4-FFF2-40B4-BE49-F238E27FC236}">
+                  <a16:creationId xmlns:a16="http://schemas.microsoft.com/office/drawing/2014/main" id="{F133D95E-0315-45D8-8579-969BEAD155CB}"/>
+                </a:ext>
+              </a:extLst>
+            </p:cNvPr>
+            <p:cNvCxnSpPr>
+              <a:cxnSpLocks/>
+              <a:stCxn id="5" idx="3"/>
+            </p:cNvCxnSpPr>
+            <p:nvPr/>
+          </p:nvCxnSpPr>
+          <p:spPr>
+            <a:xfrm flipV="1">
+              <a:off x="2915728" y="1739662"/>
+              <a:ext cx="1174632" cy="642666"/>
+            </a:xfrm>
+            <a:prstGeom prst="bentConnector3">
+              <a:avLst/>
+            </a:prstGeom>
+            <a:ln>
+              <a:solidFill>
+                <a:schemeClr val="tx1"/>
+              </a:solidFill>
+            </a:ln>
+          </p:spPr>
+          <p:style>
+            <a:lnRef idx="1">
+              <a:schemeClr val="accent1"/>
+            </a:lnRef>
+            <a:fillRef idx="0">
+              <a:schemeClr val="accent1"/>
+            </a:fillRef>
+            <a:effectRef idx="0">
+              <a:schemeClr val="accent1"/>
+            </a:effectRef>
+            <a:fontRef idx="minor">
+              <a:schemeClr val="tx1"/>
+            </a:fontRef>
+          </p:style>
+        </p:cxnSp>
+        <p:cxnSp>
+          <p:nvCxnSpPr>
+            <p:cNvPr id="20" name="Connector: Elbow 19">
+              <a:extLst>
+                <a:ext uri="{FF2B5EF4-FFF2-40B4-BE49-F238E27FC236}">
+                  <a16:creationId xmlns:a16="http://schemas.microsoft.com/office/drawing/2014/main" id="{A1C5485D-7078-4B72-887C-CAF372288B9C}"/>
+                </a:ext>
+              </a:extLst>
+            </p:cNvPr>
+            <p:cNvCxnSpPr>
+              <a:cxnSpLocks/>
+              <a:stCxn id="5" idx="3"/>
+            </p:cNvCxnSpPr>
+            <p:nvPr/>
+          </p:nvCxnSpPr>
+          <p:spPr>
+            <a:xfrm>
+              <a:off x="2915728" y="2382328"/>
+              <a:ext cx="1174632" cy="642668"/>
+            </a:xfrm>
+            <a:prstGeom prst="bentConnector3">
+              <a:avLst/>
+            </a:prstGeom>
+            <a:ln>
+              <a:solidFill>
+                <a:schemeClr val="tx1"/>
+              </a:solidFill>
+            </a:ln>
+          </p:spPr>
+          <p:style>
+            <a:lnRef idx="1">
+              <a:schemeClr val="accent1"/>
+            </a:lnRef>
+            <a:fillRef idx="0">
+              <a:schemeClr val="accent1"/>
+            </a:fillRef>
+            <a:effectRef idx="0">
+              <a:schemeClr val="accent1"/>
+            </a:effectRef>
+            <a:fontRef idx="minor">
+              <a:schemeClr val="tx1"/>
+            </a:fontRef>
+          </p:style>
+        </p:cxnSp>
+        <p:cxnSp>
+          <p:nvCxnSpPr>
+            <p:cNvPr id="24" name="Straight Connector 23">
+              <a:extLst>
+                <a:ext uri="{FF2B5EF4-FFF2-40B4-BE49-F238E27FC236}">
+                  <a16:creationId xmlns:a16="http://schemas.microsoft.com/office/drawing/2014/main" id="{1827E7BA-4388-4C26-A34A-D04C228A3805}"/>
+                </a:ext>
+              </a:extLst>
+            </p:cNvPr>
+            <p:cNvCxnSpPr>
+              <a:cxnSpLocks/>
+              <a:endCxn id="4" idx="1"/>
+            </p:cNvCxnSpPr>
+            <p:nvPr/>
+          </p:nvCxnSpPr>
+          <p:spPr>
+            <a:xfrm>
+              <a:off x="1069675" y="789317"/>
+              <a:ext cx="543463" cy="0"/>
+            </a:xfrm>
+            <a:prstGeom prst="line">
+              <a:avLst/>
+            </a:prstGeom>
+            <a:ln>
+              <a:solidFill>
+                <a:schemeClr val="tx1"/>
+              </a:solidFill>
+            </a:ln>
+          </p:spPr>
+          <p:style>
+            <a:lnRef idx="1">
+              <a:schemeClr val="accent1"/>
+            </a:lnRef>
+            <a:fillRef idx="0">
+              <a:schemeClr val="accent1"/>
+            </a:fillRef>
+            <a:effectRef idx="0">
+              <a:schemeClr val="accent1"/>
+            </a:effectRef>
+            <a:fontRef idx="minor">
+              <a:schemeClr val="tx1"/>
+            </a:fontRef>
+          </p:style>
+        </p:cxnSp>
+        <p:cxnSp>
+          <p:nvCxnSpPr>
+            <p:cNvPr id="30" name="Straight Connector 29">
+              <a:extLst>
+                <a:ext uri="{FF2B5EF4-FFF2-40B4-BE49-F238E27FC236}">
+                  <a16:creationId xmlns:a16="http://schemas.microsoft.com/office/drawing/2014/main" id="{C8F28EA7-D235-4C85-B572-146E03380562}"/>
+                </a:ext>
+              </a:extLst>
+            </p:cNvPr>
+            <p:cNvCxnSpPr>
+              <a:stCxn id="7" idx="3"/>
+              <a:endCxn id="9" idx="1"/>
+            </p:cNvCxnSpPr>
+            <p:nvPr/>
+          </p:nvCxnSpPr>
+          <p:spPr>
+            <a:xfrm>
+              <a:off x="5392949" y="1584384"/>
+              <a:ext cx="839636" cy="0"/>
+            </a:xfrm>
+            <a:prstGeom prst="line">
+              <a:avLst/>
+            </a:prstGeom>
+            <a:ln>
+              <a:solidFill>
+                <a:schemeClr val="tx1"/>
+              </a:solidFill>
+            </a:ln>
+          </p:spPr>
+          <p:style>
+            <a:lnRef idx="1">
+              <a:schemeClr val="accent1"/>
+            </a:lnRef>
+            <a:fillRef idx="0">
+              <a:schemeClr val="accent1"/>
+            </a:fillRef>
+            <a:effectRef idx="0">
+              <a:schemeClr val="accent1"/>
+            </a:effectRef>
+            <a:fontRef idx="minor">
+              <a:schemeClr val="tx1"/>
+            </a:fontRef>
+          </p:style>
+        </p:cxnSp>
+        <p:cxnSp>
+          <p:nvCxnSpPr>
+            <p:cNvPr id="32" name="Straight Connector 31">
+              <a:extLst>
+                <a:ext uri="{FF2B5EF4-FFF2-40B4-BE49-F238E27FC236}">
+                  <a16:creationId xmlns:a16="http://schemas.microsoft.com/office/drawing/2014/main" id="{E06E2927-3A97-4C45-B30C-038BD6D82274}"/>
+                </a:ext>
+              </a:extLst>
+            </p:cNvPr>
+            <p:cNvCxnSpPr>
+              <a:stCxn id="8" idx="3"/>
+              <a:endCxn id="10" idx="1"/>
+            </p:cNvCxnSpPr>
+            <p:nvPr/>
+          </p:nvCxnSpPr>
+          <p:spPr>
+            <a:xfrm>
+              <a:off x="5397252" y="3180272"/>
+              <a:ext cx="835333" cy="0"/>
+            </a:xfrm>
+            <a:prstGeom prst="line">
+              <a:avLst/>
+            </a:prstGeom>
+            <a:ln>
+              <a:solidFill>
+                <a:schemeClr val="tx1"/>
+              </a:solidFill>
+            </a:ln>
+          </p:spPr>
+          <p:style>
+            <a:lnRef idx="1">
+              <a:schemeClr val="accent1"/>
+            </a:lnRef>
+            <a:fillRef idx="0">
+              <a:schemeClr val="accent1"/>
+            </a:fillRef>
+            <a:effectRef idx="0">
+              <a:schemeClr val="accent1"/>
+            </a:effectRef>
+            <a:fontRef idx="minor">
+              <a:schemeClr val="tx1"/>
+            </a:fontRef>
+          </p:style>
+        </p:cxnSp>
+        <p:cxnSp>
+          <p:nvCxnSpPr>
+            <p:cNvPr id="42" name="Straight Connector 41">
+              <a:extLst>
+                <a:ext uri="{FF2B5EF4-FFF2-40B4-BE49-F238E27FC236}">
+                  <a16:creationId xmlns:a16="http://schemas.microsoft.com/office/drawing/2014/main" id="{7607FE7A-3739-480F-AE01-9C9CB3574BFC}"/>
+                </a:ext>
+              </a:extLst>
+            </p:cNvPr>
+            <p:cNvCxnSpPr>
+              <a:cxnSpLocks/>
+              <a:endCxn id="5" idx="1"/>
+            </p:cNvCxnSpPr>
+            <p:nvPr/>
+          </p:nvCxnSpPr>
+          <p:spPr>
+            <a:xfrm>
+              <a:off x="1069675" y="2382328"/>
+              <a:ext cx="543464" cy="0"/>
+            </a:xfrm>
+            <a:prstGeom prst="line">
+              <a:avLst/>
+            </a:prstGeom>
+            <a:ln>
+              <a:solidFill>
+                <a:schemeClr val="tx1"/>
+              </a:solidFill>
+            </a:ln>
+          </p:spPr>
+          <p:style>
+            <a:lnRef idx="1">
+              <a:schemeClr val="accent1"/>
+            </a:lnRef>
+            <a:fillRef idx="0">
+              <a:schemeClr val="accent1"/>
+            </a:fillRef>
+            <a:effectRef idx="0">
+              <a:schemeClr val="accent1"/>
+            </a:effectRef>
+            <a:fontRef idx="minor">
+              <a:schemeClr val="tx1"/>
+            </a:fontRef>
+          </p:style>
+        </p:cxnSp>
+        <p:cxnSp>
+          <p:nvCxnSpPr>
+            <p:cNvPr id="44" name="Straight Connector 43">
+              <a:extLst>
+                <a:ext uri="{FF2B5EF4-FFF2-40B4-BE49-F238E27FC236}">
+                  <a16:creationId xmlns:a16="http://schemas.microsoft.com/office/drawing/2014/main" id="{A7B8B0FB-CEC8-4901-AB9E-2A2BAE96FB26}"/>
+                </a:ext>
+              </a:extLst>
+            </p:cNvPr>
+            <p:cNvCxnSpPr>
+              <a:cxnSpLocks/>
+              <a:endCxn id="6" idx="1"/>
+            </p:cNvCxnSpPr>
+            <p:nvPr/>
+          </p:nvCxnSpPr>
+          <p:spPr>
+            <a:xfrm>
+              <a:off x="1069675" y="3978216"/>
+              <a:ext cx="543463" cy="0"/>
+            </a:xfrm>
+            <a:prstGeom prst="line">
+              <a:avLst/>
+            </a:prstGeom>
+            <a:ln>
+              <a:solidFill>
+                <a:schemeClr val="tx1"/>
+              </a:solidFill>
+            </a:ln>
+          </p:spPr>
+          <p:style>
+            <a:lnRef idx="1">
+              <a:schemeClr val="accent1"/>
+            </a:lnRef>
+            <a:fillRef idx="0">
+              <a:schemeClr val="accent1"/>
+            </a:fillRef>
+            <a:effectRef idx="0">
+              <a:schemeClr val="accent1"/>
+            </a:effectRef>
+            <a:fontRef idx="minor">
+              <a:schemeClr val="tx1"/>
+            </a:fontRef>
+          </p:style>
+        </p:cxnSp>
+        <p:cxnSp>
+          <p:nvCxnSpPr>
+            <p:cNvPr id="61" name="Straight Connector 60">
+              <a:extLst>
+                <a:ext uri="{FF2B5EF4-FFF2-40B4-BE49-F238E27FC236}">
+                  <a16:creationId xmlns:a16="http://schemas.microsoft.com/office/drawing/2014/main" id="{95D7450E-1402-49FF-AD32-60CB96ADA7C5}"/>
+                </a:ext>
+              </a:extLst>
+            </p:cNvPr>
+            <p:cNvCxnSpPr>
+              <a:cxnSpLocks/>
+            </p:cNvCxnSpPr>
+            <p:nvPr/>
+          </p:nvCxnSpPr>
+          <p:spPr>
+            <a:xfrm>
+              <a:off x="7535174" y="1559942"/>
+              <a:ext cx="543463" cy="0"/>
+            </a:xfrm>
+            <a:prstGeom prst="line">
+              <a:avLst/>
+            </a:prstGeom>
+            <a:ln>
+              <a:solidFill>
+                <a:schemeClr val="tx1"/>
+              </a:solidFill>
+            </a:ln>
+          </p:spPr>
+          <p:style>
+            <a:lnRef idx="1">
+              <a:schemeClr val="accent1"/>
+            </a:lnRef>
+            <a:fillRef idx="0">
+              <a:schemeClr val="accent1"/>
+            </a:fillRef>
+            <a:effectRef idx="0">
+              <a:schemeClr val="accent1"/>
+            </a:effectRef>
+            <a:fontRef idx="minor">
+              <a:schemeClr val="tx1"/>
+            </a:fontRef>
+          </p:style>
+        </p:cxnSp>
+        <p:sp>
+          <p:nvSpPr>
+            <p:cNvPr id="63" name="TextBox 62">
+              <a:extLst>
+                <a:ext uri="{FF2B5EF4-FFF2-40B4-BE49-F238E27FC236}">
+                  <a16:creationId xmlns:a16="http://schemas.microsoft.com/office/drawing/2014/main" id="{E01D2A66-D6B5-4705-A4F9-4AFB5EA159B9}"/>
+                </a:ext>
+              </a:extLst>
+            </p:cNvPr>
+            <p:cNvSpPr txBox="1"/>
+            <p:nvPr/>
+          </p:nvSpPr>
+          <p:spPr>
+            <a:xfrm>
+              <a:off x="1174653" y="500332"/>
+              <a:ext cx="317716" cy="369332"/>
+            </a:xfrm>
+            <a:prstGeom prst="rect">
+              <a:avLst/>
+            </a:prstGeom>
+            <a:noFill/>
+          </p:spPr>
+          <p:txBody>
+            <a:bodyPr wrap="none" rtlCol="0">
+              <a:spAutoFit/>
+            </a:bodyPr>
+            <a:lstStyle/>
+            <a:p>
+              <a:r>
+                <a:rPr lang="en-US" dirty="0"/>
+                <a:t>A</a:t>
+              </a:r>
+            </a:p>
+          </p:txBody>
+        </p:sp>
+        <p:sp>
+          <p:nvSpPr>
+            <p:cNvPr id="64" name="TextBox 63">
+              <a:extLst>
+                <a:ext uri="{FF2B5EF4-FFF2-40B4-BE49-F238E27FC236}">
+                  <a16:creationId xmlns:a16="http://schemas.microsoft.com/office/drawing/2014/main" id="{05F515A2-1781-443E-9104-2E5B061E4575}"/>
+                </a:ext>
+              </a:extLst>
+            </p:cNvPr>
+            <p:cNvSpPr txBox="1"/>
+            <p:nvPr/>
+          </p:nvSpPr>
+          <p:spPr>
+            <a:xfrm>
+              <a:off x="1174653" y="2060274"/>
+              <a:ext cx="317716" cy="369332"/>
+            </a:xfrm>
+            <a:prstGeom prst="rect">
+              <a:avLst/>
+            </a:prstGeom>
+            <a:noFill/>
+          </p:spPr>
+          <p:txBody>
+            <a:bodyPr wrap="none" rtlCol="0">
+              <a:spAutoFit/>
+            </a:bodyPr>
+            <a:lstStyle/>
+            <a:p>
+              <a:r>
+                <a:rPr lang="en-US" dirty="0"/>
+                <a:t>B</a:t>
+              </a:r>
+            </a:p>
+          </p:txBody>
+        </p:sp>
+        <p:sp>
+          <p:nvSpPr>
+            <p:cNvPr id="65" name="TextBox 64">
+              <a:extLst>
+                <a:ext uri="{FF2B5EF4-FFF2-40B4-BE49-F238E27FC236}">
+                  <a16:creationId xmlns:a16="http://schemas.microsoft.com/office/drawing/2014/main" id="{5CDEFD57-A624-48D0-A3EA-8DD31419AAF2}"/>
+                </a:ext>
+              </a:extLst>
+            </p:cNvPr>
+            <p:cNvSpPr txBox="1"/>
+            <p:nvPr/>
+          </p:nvSpPr>
+          <p:spPr>
+            <a:xfrm>
+              <a:off x="1169043" y="3667662"/>
+              <a:ext cx="317716" cy="369332"/>
+            </a:xfrm>
+            <a:prstGeom prst="rect">
+              <a:avLst/>
+            </a:prstGeom>
+            <a:noFill/>
+          </p:spPr>
+          <p:txBody>
+            <a:bodyPr wrap="none" rtlCol="0">
+              <a:spAutoFit/>
+            </a:bodyPr>
+            <a:lstStyle/>
+            <a:p>
+              <a:r>
+                <a:rPr lang="en-US" dirty="0"/>
+                <a:t>C</a:t>
+              </a:r>
+            </a:p>
+          </p:txBody>
+        </p:sp>
+        <p:sp>
+          <p:nvSpPr>
+            <p:cNvPr id="66" name="TextBox 65">
+              <a:extLst>
+                <a:ext uri="{FF2B5EF4-FFF2-40B4-BE49-F238E27FC236}">
+                  <a16:creationId xmlns:a16="http://schemas.microsoft.com/office/drawing/2014/main" id="{F7FB3522-E6D1-4257-AF95-C96F8AFF478F}"/>
+                </a:ext>
+              </a:extLst>
+            </p:cNvPr>
+            <p:cNvSpPr txBox="1"/>
+            <p:nvPr/>
+          </p:nvSpPr>
+          <p:spPr>
+            <a:xfrm>
+              <a:off x="7643238" y="1247319"/>
+              <a:ext cx="327334" cy="369332"/>
+            </a:xfrm>
+            <a:prstGeom prst="rect">
+              <a:avLst/>
+            </a:prstGeom>
+            <a:noFill/>
+          </p:spPr>
+          <p:txBody>
+            <a:bodyPr wrap="none" rtlCol="0">
+              <a:spAutoFit/>
+            </a:bodyPr>
+            <a:lstStyle/>
+            <a:p>
+              <a:r>
+                <a:rPr lang="en-US" dirty="0"/>
+                <a:t>D</a:t>
+              </a:r>
+            </a:p>
+          </p:txBody>
+        </p:sp>
+        <p:cxnSp>
+          <p:nvCxnSpPr>
+            <p:cNvPr id="68" name="Straight Connector 67">
+              <a:extLst>
+                <a:ext uri="{FF2B5EF4-FFF2-40B4-BE49-F238E27FC236}">
+                  <a16:creationId xmlns:a16="http://schemas.microsoft.com/office/drawing/2014/main" id="{F193A147-1F98-4287-871F-FAAD1B72E347}"/>
+                </a:ext>
+              </a:extLst>
+            </p:cNvPr>
+            <p:cNvCxnSpPr>
+              <a:cxnSpLocks/>
+              <a:stCxn id="10" idx="3"/>
+            </p:cNvCxnSpPr>
+            <p:nvPr/>
+          </p:nvCxnSpPr>
+          <p:spPr>
+            <a:xfrm>
+              <a:off x="7535174" y="3180272"/>
+              <a:ext cx="543463" cy="0"/>
+            </a:xfrm>
+            <a:prstGeom prst="line">
+              <a:avLst/>
+            </a:prstGeom>
+            <a:ln>
+              <a:solidFill>
+                <a:schemeClr val="tx1"/>
+              </a:solidFill>
+            </a:ln>
+          </p:spPr>
+          <p:style>
+            <a:lnRef idx="1">
+              <a:schemeClr val="accent1"/>
+            </a:lnRef>
+            <a:fillRef idx="0">
+              <a:schemeClr val="accent1"/>
+            </a:fillRef>
+            <a:effectRef idx="0">
+              <a:schemeClr val="accent1"/>
+            </a:effectRef>
+            <a:fontRef idx="minor">
+              <a:schemeClr val="tx1"/>
+            </a:fontRef>
+          </p:style>
+        </p:cxnSp>
+        <p:sp>
+          <p:nvSpPr>
+            <p:cNvPr id="70" name="TextBox 69">
+              <a:extLst>
+                <a:ext uri="{FF2B5EF4-FFF2-40B4-BE49-F238E27FC236}">
+                  <a16:creationId xmlns:a16="http://schemas.microsoft.com/office/drawing/2014/main" id="{B3CC5F49-9997-4388-BF44-C0547C5E89BE}"/>
+                </a:ext>
+              </a:extLst>
+            </p:cNvPr>
+            <p:cNvSpPr txBox="1"/>
+            <p:nvPr/>
+          </p:nvSpPr>
+          <p:spPr>
+            <a:xfrm>
+              <a:off x="7643238" y="2840330"/>
+              <a:ext cx="296876" cy="369332"/>
+            </a:xfrm>
+            <a:prstGeom prst="rect">
+              <a:avLst/>
+            </a:prstGeom>
+            <a:noFill/>
+          </p:spPr>
+          <p:txBody>
+            <a:bodyPr wrap="none" rtlCol="0">
+              <a:spAutoFit/>
+            </a:bodyPr>
+            <a:lstStyle/>
+            <a:p>
+              <a:r>
+                <a:rPr lang="en-US" dirty="0"/>
+                <a:t>E</a:t>
+              </a:r>
+            </a:p>
+          </p:txBody>
+        </p:sp>
+        <p:sp>
+          <p:nvSpPr>
+            <p:cNvPr id="74" name="TextBox 73">
+              <a:extLst>
+                <a:ext uri="{FF2B5EF4-FFF2-40B4-BE49-F238E27FC236}">
+                  <a16:creationId xmlns:a16="http://schemas.microsoft.com/office/drawing/2014/main" id="{DFAC674C-EB5A-4129-A103-326C23BE7940}"/>
+                </a:ext>
+              </a:extLst>
+            </p:cNvPr>
+            <p:cNvSpPr txBox="1"/>
+            <p:nvPr/>
+          </p:nvSpPr>
+          <p:spPr>
+            <a:xfrm>
+              <a:off x="3036496" y="481640"/>
+              <a:ext cx="316112" cy="369332"/>
+            </a:xfrm>
+            <a:prstGeom prst="rect">
+              <a:avLst/>
+            </a:prstGeom>
+            <a:noFill/>
+          </p:spPr>
+          <p:txBody>
+            <a:bodyPr wrap="none" rtlCol="0">
+              <a:spAutoFit/>
+            </a:bodyPr>
+            <a:lstStyle/>
+            <a:p>
+              <a:r>
+                <a:rPr lang="en-US" dirty="0"/>
+                <a:t>V</a:t>
+              </a:r>
+            </a:p>
+          </p:txBody>
+        </p:sp>
+        <p:sp>
+          <p:nvSpPr>
+            <p:cNvPr id="75" name="TextBox 74">
+              <a:extLst>
+                <a:ext uri="{FF2B5EF4-FFF2-40B4-BE49-F238E27FC236}">
+                  <a16:creationId xmlns:a16="http://schemas.microsoft.com/office/drawing/2014/main" id="{C74760B5-8613-444A-871C-1BAFC308C874}"/>
+                </a:ext>
+              </a:extLst>
+            </p:cNvPr>
+            <p:cNvSpPr txBox="1"/>
+            <p:nvPr/>
+          </p:nvSpPr>
+          <p:spPr>
+            <a:xfrm>
+              <a:off x="2999627" y="2078962"/>
+              <a:ext cx="389850" cy="369332"/>
+            </a:xfrm>
+            <a:prstGeom prst="rect">
+              <a:avLst/>
+            </a:prstGeom>
+            <a:noFill/>
+          </p:spPr>
+          <p:txBody>
+            <a:bodyPr wrap="none" rtlCol="0">
+              <a:spAutoFit/>
+            </a:bodyPr>
+            <a:lstStyle/>
+            <a:p>
+              <a:r>
+                <a:rPr lang="en-US" dirty="0"/>
+                <a:t>W</a:t>
+              </a:r>
+            </a:p>
+          </p:txBody>
+        </p:sp>
+        <p:sp>
+          <p:nvSpPr>
+            <p:cNvPr id="76" name="TextBox 75">
+              <a:extLst>
+                <a:ext uri="{FF2B5EF4-FFF2-40B4-BE49-F238E27FC236}">
+                  <a16:creationId xmlns:a16="http://schemas.microsoft.com/office/drawing/2014/main" id="{C0144458-D844-475B-A335-ED60CB90E42F}"/>
+                </a:ext>
+              </a:extLst>
+            </p:cNvPr>
+            <p:cNvSpPr txBox="1"/>
+            <p:nvPr/>
+          </p:nvSpPr>
+          <p:spPr>
+            <a:xfrm>
+              <a:off x="3042106" y="3667662"/>
+              <a:ext cx="304892" cy="369332"/>
+            </a:xfrm>
+            <a:prstGeom prst="rect">
+              <a:avLst/>
+            </a:prstGeom>
+            <a:noFill/>
+          </p:spPr>
+          <p:txBody>
+            <a:bodyPr wrap="none" rtlCol="0">
+              <a:spAutoFit/>
+            </a:bodyPr>
+            <a:lstStyle/>
+            <a:p>
+              <a:r>
+                <a:rPr lang="en-US" dirty="0"/>
+                <a:t>X</a:t>
+              </a:r>
+            </a:p>
+          </p:txBody>
+        </p:sp>
+        <p:sp>
+          <p:nvSpPr>
+            <p:cNvPr id="77" name="TextBox 76">
+              <a:extLst>
+                <a:ext uri="{FF2B5EF4-FFF2-40B4-BE49-F238E27FC236}">
+                  <a16:creationId xmlns:a16="http://schemas.microsoft.com/office/drawing/2014/main" id="{FF95B563-5830-490E-B99C-16828EA999C6}"/>
+                </a:ext>
+              </a:extLst>
+            </p:cNvPr>
+            <p:cNvSpPr txBox="1"/>
+            <p:nvPr/>
+          </p:nvSpPr>
+          <p:spPr>
+            <a:xfrm>
+              <a:off x="5664329" y="1302760"/>
+              <a:ext cx="296876" cy="369332"/>
+            </a:xfrm>
+            <a:prstGeom prst="rect">
+              <a:avLst/>
+            </a:prstGeom>
+            <a:noFill/>
+          </p:spPr>
+          <p:txBody>
+            <a:bodyPr wrap="none" rtlCol="0">
+              <a:spAutoFit/>
+            </a:bodyPr>
+            <a:lstStyle/>
+            <a:p>
+              <a:r>
+                <a:rPr lang="en-US" dirty="0"/>
+                <a:t>Y</a:t>
+              </a:r>
+            </a:p>
+          </p:txBody>
+        </p:sp>
+        <p:sp>
+          <p:nvSpPr>
+            <p:cNvPr id="78" name="TextBox 77">
+              <a:extLst>
+                <a:ext uri="{FF2B5EF4-FFF2-40B4-BE49-F238E27FC236}">
+                  <a16:creationId xmlns:a16="http://schemas.microsoft.com/office/drawing/2014/main" id="{EE719C06-C54B-4F69-ADC3-3F2F3E2F5EB6}"/>
+                </a:ext>
+              </a:extLst>
+            </p:cNvPr>
+            <p:cNvSpPr txBox="1"/>
+            <p:nvPr/>
+          </p:nvSpPr>
+          <p:spPr>
+            <a:xfrm>
+              <a:off x="5689855" y="2889847"/>
+              <a:ext cx="254109" cy="369332"/>
+            </a:xfrm>
+            <a:prstGeom prst="rect">
+              <a:avLst/>
+            </a:prstGeom>
+            <a:noFill/>
+          </p:spPr>
+          <p:txBody>
+            <a:bodyPr wrap="square" rtlCol="0">
+              <a:spAutoFit/>
+            </a:bodyPr>
+            <a:lstStyle/>
+            <a:p>
+              <a:r>
+                <a:rPr lang="en-US" dirty="0"/>
+                <a:t>Z</a:t>
+              </a:r>
+            </a:p>
+          </p:txBody>
+        </p:sp>
+      </p:grpSp>
+    </p:spTree>
+    <p:extLst>
+      <p:ext uri="{BB962C8B-B14F-4D97-AF65-F5344CB8AC3E}">
+        <p14:creationId xmlns:p14="http://schemas.microsoft.com/office/powerpoint/2010/main" val="1070393926"/>
+      </p:ext>
+    </p:extLst>
+  </p:cSld>
+  <p:clrMapOvr>
+    <a:masterClrMapping/>
+  </p:clrMapOvr>
+</p:sld>
+</file>
+
 <file path=ppt/theme/theme1.xml><?xml version="1.0" encoding="utf-8"?>
 <a:theme xmlns:a="http://schemas.openxmlformats.org/drawingml/2006/main" name="Office Theme">
   <a:themeElements>
@@ -9039,13 +10738,13 @@
 <file path=customXml/itemProps3.xml><?xml version="1.0" encoding="utf-8"?>
 <ds:datastoreItem xmlns:ds="http://schemas.openxmlformats.org/officeDocument/2006/customXml" ds:itemID="{197AE0C9-93A1-4CCC-BD97-2030B997B33F}">
   <ds:schemaRefs>
-    <ds:schemaRef ds:uri="http://schemas.microsoft.com/office/infopath/2007/PartnerControls"/>
+    <ds:schemaRef ds:uri="http://purl.org/dc/elements/1.1/"/>
     <ds:schemaRef ds:uri="http://schemas.microsoft.com/office/2006/metadata/properties"/>
-    <ds:schemaRef ds:uri="http://schemas.microsoft.com/office/2006/documentManagement/types"/>
     <ds:schemaRef ds:uri="http://purl.org/dc/terms/"/>
     <ds:schemaRef ds:uri="http://schemas.openxmlformats.org/package/2006/metadata/core-properties"/>
     <ds:schemaRef ds:uri="bcb3ac5f-01e2-41ad-b451-1fdd9db804f2"/>
-    <ds:schemaRef ds:uri="http://purl.org/dc/elements/1.1/"/>
+    <ds:schemaRef ds:uri="http://schemas.microsoft.com/office/2006/documentManagement/types"/>
+    <ds:schemaRef ds:uri="http://schemas.microsoft.com/office/infopath/2007/PartnerControls"/>
     <ds:schemaRef ds:uri="http://www.w3.org/XML/1998/namespace"/>
     <ds:schemaRef ds:uri="http://purl.org/dc/dcmitype/"/>
   </ds:schemaRefs>

</xml_diff>

<commit_message>
one last correction to python file, jupyter notebook ready to publish
</commit_message>
<xml_diff>
--- a/Logic_Gate.pptx
+++ b/Logic_Gate.pptx
@@ -7,6 +7,7 @@
   <p:sldIdLst>
     <p:sldId id="256" r:id="rId5"/>
     <p:sldId id="257" r:id="rId6"/>
+    <p:sldId id="258" r:id="rId7"/>
   </p:sldIdLst>
   <p:sldSz cx="12192000" cy="6858000"/>
   <p:notesSz cx="6858000" cy="9144000"/>
@@ -507,6 +508,62 @@
       </pc:sldChg>
     </pc:docChg>
   </pc:docChgLst>
+  <pc:docChgLst>
+    <pc:chgData name="Thomas Stuart" userId="c30a2a5e-a625-4fe5-91bb-6ef716ed15a4" providerId="ADAL" clId="{C620587D-04FB-4E71-B8CD-A05EEC2E2917}"/>
+    <pc:docChg chg="addSld modSld">
+      <pc:chgData name="Thomas Stuart" userId="c30a2a5e-a625-4fe5-91bb-6ef716ed15a4" providerId="ADAL" clId="{C620587D-04FB-4E71-B8CD-A05EEC2E2917}" dt="2021-11-22T03:31:58.917" v="49" actId="20577"/>
+      <pc:docMkLst>
+        <pc:docMk/>
+      </pc:docMkLst>
+      <pc:sldChg chg="modSp add">
+        <pc:chgData name="Thomas Stuart" userId="c30a2a5e-a625-4fe5-91bb-6ef716ed15a4" providerId="ADAL" clId="{C620587D-04FB-4E71-B8CD-A05EEC2E2917}" dt="2021-11-22T03:31:58.917" v="49" actId="20577"/>
+        <pc:sldMkLst>
+          <pc:docMk/>
+          <pc:sldMk cId="2298552989" sldId="258"/>
+        </pc:sldMkLst>
+        <pc:spChg chg="mod">
+          <ac:chgData name="Thomas Stuart" userId="c30a2a5e-a625-4fe5-91bb-6ef716ed15a4" providerId="ADAL" clId="{C620587D-04FB-4E71-B8CD-A05EEC2E2917}" dt="2021-11-22T03:31:36.891" v="14" actId="1037"/>
+          <ac:spMkLst>
+            <pc:docMk/>
+            <pc:sldMk cId="2298552989" sldId="258"/>
+            <ac:spMk id="63" creationId="{E01D2A66-D6B5-4705-A4F9-4AFB5EA159B9}"/>
+          </ac:spMkLst>
+        </pc:spChg>
+        <pc:spChg chg="mod">
+          <ac:chgData name="Thomas Stuart" userId="c30a2a5e-a625-4fe5-91bb-6ef716ed15a4" providerId="ADAL" clId="{C620587D-04FB-4E71-B8CD-A05EEC2E2917}" dt="2021-11-22T03:31:44.746" v="28" actId="1037"/>
+          <ac:spMkLst>
+            <pc:docMk/>
+            <pc:sldMk cId="2298552989" sldId="258"/>
+            <ac:spMk id="64" creationId="{05F515A2-1781-443E-9104-2E5B061E4575}"/>
+          </ac:spMkLst>
+        </pc:spChg>
+        <pc:spChg chg="mod">
+          <ac:chgData name="Thomas Stuart" userId="c30a2a5e-a625-4fe5-91bb-6ef716ed15a4" providerId="ADAL" clId="{C620587D-04FB-4E71-B8CD-A05EEC2E2917}" dt="2021-11-22T03:31:51.220" v="41" actId="1037"/>
+          <ac:spMkLst>
+            <pc:docMk/>
+            <pc:sldMk cId="2298552989" sldId="258"/>
+            <ac:spMk id="65" creationId="{5CDEFD57-A624-48D0-A3EA-8DD31419AAF2}"/>
+          </ac:spMkLst>
+        </pc:spChg>
+        <pc:spChg chg="mod">
+          <ac:chgData name="Thomas Stuart" userId="c30a2a5e-a625-4fe5-91bb-6ef716ed15a4" providerId="ADAL" clId="{C620587D-04FB-4E71-B8CD-A05EEC2E2917}" dt="2021-11-22T03:31:55.594" v="45" actId="20577"/>
+          <ac:spMkLst>
+            <pc:docMk/>
+            <pc:sldMk cId="2298552989" sldId="258"/>
+            <ac:spMk id="66" creationId="{F7FB3522-E6D1-4257-AF95-C96F8AFF478F}"/>
+          </ac:spMkLst>
+        </pc:spChg>
+        <pc:spChg chg="mod">
+          <ac:chgData name="Thomas Stuart" userId="c30a2a5e-a625-4fe5-91bb-6ef716ed15a4" providerId="ADAL" clId="{C620587D-04FB-4E71-B8CD-A05EEC2E2917}" dt="2021-11-22T03:31:58.917" v="49" actId="20577"/>
+          <ac:spMkLst>
+            <pc:docMk/>
+            <pc:sldMk cId="2298552989" sldId="258"/>
+            <ac:spMk id="70" creationId="{B3CC5F49-9997-4388-BF44-C0547C5E89BE}"/>
+          </ac:spMkLst>
+        </pc:spChg>
+      </pc:sldChg>
+    </pc:docChg>
+  </pc:docChgLst>
 </pc:chgInfo>
 </file>
 
@@ -657,7 +714,7 @@
           <a:p>
             <a:fld id="{B4208711-226E-4296-B630-B65121974DC1}" type="datetimeFigureOut">
               <a:rPr lang="en-US" smtClean="0"/>
-              <a:t>11/11/2021</a:t>
+              <a:t>11/21/2021</a:t>
             </a:fld>
             <a:endParaRPr lang="en-US"/>
           </a:p>
@@ -855,7 +912,7 @@
           <a:p>
             <a:fld id="{B4208711-226E-4296-B630-B65121974DC1}" type="datetimeFigureOut">
               <a:rPr lang="en-US" smtClean="0"/>
-              <a:t>11/11/2021</a:t>
+              <a:t>11/21/2021</a:t>
             </a:fld>
             <a:endParaRPr lang="en-US"/>
           </a:p>
@@ -1063,7 +1120,7 @@
           <a:p>
             <a:fld id="{B4208711-226E-4296-B630-B65121974DC1}" type="datetimeFigureOut">
               <a:rPr lang="en-US" smtClean="0"/>
-              <a:t>11/11/2021</a:t>
+              <a:t>11/21/2021</a:t>
             </a:fld>
             <a:endParaRPr lang="en-US"/>
           </a:p>
@@ -1261,7 +1318,7 @@
           <a:p>
             <a:fld id="{B4208711-226E-4296-B630-B65121974DC1}" type="datetimeFigureOut">
               <a:rPr lang="en-US" smtClean="0"/>
-              <a:t>11/11/2021</a:t>
+              <a:t>11/21/2021</a:t>
             </a:fld>
             <a:endParaRPr lang="en-US"/>
           </a:p>
@@ -1536,7 +1593,7 @@
           <a:p>
             <a:fld id="{B4208711-226E-4296-B630-B65121974DC1}" type="datetimeFigureOut">
               <a:rPr lang="en-US" smtClean="0"/>
-              <a:t>11/11/2021</a:t>
+              <a:t>11/21/2021</a:t>
             </a:fld>
             <a:endParaRPr lang="en-US"/>
           </a:p>
@@ -1801,7 +1858,7 @@
           <a:p>
             <a:fld id="{B4208711-226E-4296-B630-B65121974DC1}" type="datetimeFigureOut">
               <a:rPr lang="en-US" smtClean="0"/>
-              <a:t>11/11/2021</a:t>
+              <a:t>11/21/2021</a:t>
             </a:fld>
             <a:endParaRPr lang="en-US"/>
           </a:p>
@@ -2213,7 +2270,7 @@
           <a:p>
             <a:fld id="{B4208711-226E-4296-B630-B65121974DC1}" type="datetimeFigureOut">
               <a:rPr lang="en-US" smtClean="0"/>
-              <a:t>11/11/2021</a:t>
+              <a:t>11/21/2021</a:t>
             </a:fld>
             <a:endParaRPr lang="en-US"/>
           </a:p>
@@ -2354,7 +2411,7 @@
           <a:p>
             <a:fld id="{B4208711-226E-4296-B630-B65121974DC1}" type="datetimeFigureOut">
               <a:rPr lang="en-US" smtClean="0"/>
-              <a:t>11/11/2021</a:t>
+              <a:t>11/21/2021</a:t>
             </a:fld>
             <a:endParaRPr lang="en-US"/>
           </a:p>
@@ -2467,7 +2524,7 @@
           <a:p>
             <a:fld id="{B4208711-226E-4296-B630-B65121974DC1}" type="datetimeFigureOut">
               <a:rPr lang="en-US" smtClean="0"/>
-              <a:t>11/11/2021</a:t>
+              <a:t>11/21/2021</a:t>
             </a:fld>
             <a:endParaRPr lang="en-US"/>
           </a:p>
@@ -2778,7 +2835,7 @@
           <a:p>
             <a:fld id="{B4208711-226E-4296-B630-B65121974DC1}" type="datetimeFigureOut">
               <a:rPr lang="en-US" smtClean="0"/>
-              <a:t>11/11/2021</a:t>
+              <a:t>11/21/2021</a:t>
             </a:fld>
             <a:endParaRPr lang="en-US"/>
           </a:p>
@@ -3066,7 +3123,7 @@
           <a:p>
             <a:fld id="{B4208711-226E-4296-B630-B65121974DC1}" type="datetimeFigureOut">
               <a:rPr lang="en-US" smtClean="0"/>
-              <a:t>11/11/2021</a:t>
+              <a:t>11/21/2021</a:t>
             </a:fld>
             <a:endParaRPr lang="en-US"/>
           </a:p>
@@ -3307,7 +3364,7 @@
           <a:p>
             <a:fld id="{B4208711-226E-4296-B630-B65121974DC1}" type="datetimeFigureOut">
               <a:rPr lang="en-US" smtClean="0"/>
-              <a:t>11/11/2021</a:t>
+              <a:t>11/21/2021</a:t>
             </a:fld>
             <a:endParaRPr lang="en-US"/>
           </a:p>
@@ -10209,6 +10266,1302 @@
 </p:sld>
 </file>
 
+<file path=ppt/slides/slide3.xml><?xml version="1.0" encoding="utf-8"?>
+<p:sld xmlns:a="http://schemas.openxmlformats.org/drawingml/2006/main" xmlns:r="http://schemas.openxmlformats.org/officeDocument/2006/relationships" xmlns:p="http://schemas.openxmlformats.org/presentationml/2006/main">
+  <p:cSld>
+    <p:spTree>
+      <p:nvGrpSpPr>
+        <p:cNvPr id="1" name=""/>
+        <p:cNvGrpSpPr/>
+        <p:nvPr/>
+      </p:nvGrpSpPr>
+      <p:grpSpPr>
+        <a:xfrm>
+          <a:off x="0" y="0"/>
+          <a:ext cx="0" cy="0"/>
+          <a:chOff x="0" y="0"/>
+          <a:chExt cx="0" cy="0"/>
+        </a:xfrm>
+      </p:grpSpPr>
+      <p:grpSp>
+        <p:nvGrpSpPr>
+          <p:cNvPr id="2" name="Group 1">
+            <a:extLst>
+              <a:ext uri="{FF2B5EF4-FFF2-40B4-BE49-F238E27FC236}">
+                <a16:creationId xmlns:a16="http://schemas.microsoft.com/office/drawing/2014/main" id="{29F44142-00DE-420A-92C5-CF7E986A1F17}"/>
+              </a:ext>
+            </a:extLst>
+          </p:cNvPr>
+          <p:cNvGrpSpPr/>
+          <p:nvPr/>
+        </p:nvGrpSpPr>
+        <p:grpSpPr>
+          <a:xfrm>
+            <a:off x="999995" y="414068"/>
+            <a:ext cx="7308810" cy="3939397"/>
+            <a:chOff x="999995" y="414068"/>
+            <a:chExt cx="7308810" cy="3939397"/>
+          </a:xfrm>
+        </p:grpSpPr>
+        <p:sp>
+          <p:nvSpPr>
+            <p:cNvPr id="4" name="Rectangle 3">
+              <a:extLst>
+                <a:ext uri="{FF2B5EF4-FFF2-40B4-BE49-F238E27FC236}">
+                  <a16:creationId xmlns:a16="http://schemas.microsoft.com/office/drawing/2014/main" id="{A8A92654-B1D8-42A1-9806-18E37BB29450}"/>
+                </a:ext>
+              </a:extLst>
+            </p:cNvPr>
+            <p:cNvSpPr/>
+            <p:nvPr/>
+          </p:nvSpPr>
+          <p:spPr>
+            <a:xfrm>
+              <a:off x="1613138" y="414068"/>
+              <a:ext cx="1302589" cy="750498"/>
+            </a:xfrm>
+            <a:prstGeom prst="rect">
+              <a:avLst/>
+            </a:prstGeom>
+            <a:noFill/>
+            <a:ln>
+              <a:solidFill>
+                <a:schemeClr val="tx1"/>
+              </a:solidFill>
+            </a:ln>
+          </p:spPr>
+          <p:style>
+            <a:lnRef idx="2">
+              <a:schemeClr val="accent1">
+                <a:shade val="50000"/>
+              </a:schemeClr>
+            </a:lnRef>
+            <a:fillRef idx="1">
+              <a:schemeClr val="accent1"/>
+            </a:fillRef>
+            <a:effectRef idx="0">
+              <a:schemeClr val="accent1"/>
+            </a:effectRef>
+            <a:fontRef idx="minor">
+              <a:schemeClr val="lt1"/>
+            </a:fontRef>
+          </p:style>
+          <p:txBody>
+            <a:bodyPr rtlCol="0" anchor="ctr"/>
+            <a:lstStyle/>
+            <a:p>
+              <a:pPr algn="ctr"/>
+              <a:r>
+                <a:rPr lang="en-US" sz="1400" dirty="0">
+                  <a:solidFill>
+                    <a:schemeClr val="tx1"/>
+                  </a:solidFill>
+                </a:rPr>
+                <a:t>Power Relay 1 (P1)</a:t>
+              </a:r>
+            </a:p>
+          </p:txBody>
+        </p:sp>
+        <p:sp>
+          <p:nvSpPr>
+            <p:cNvPr id="5" name="Rectangle 4">
+              <a:extLst>
+                <a:ext uri="{FF2B5EF4-FFF2-40B4-BE49-F238E27FC236}">
+                  <a16:creationId xmlns:a16="http://schemas.microsoft.com/office/drawing/2014/main" id="{F06D11FA-CDB6-4AEA-9AB4-464177E412E2}"/>
+                </a:ext>
+              </a:extLst>
+            </p:cNvPr>
+            <p:cNvSpPr/>
+            <p:nvPr/>
+          </p:nvSpPr>
+          <p:spPr>
+            <a:xfrm>
+              <a:off x="1613139" y="2007079"/>
+              <a:ext cx="1302589" cy="750498"/>
+            </a:xfrm>
+            <a:prstGeom prst="rect">
+              <a:avLst/>
+            </a:prstGeom>
+            <a:noFill/>
+            <a:ln>
+              <a:solidFill>
+                <a:schemeClr val="tx1"/>
+              </a:solidFill>
+            </a:ln>
+          </p:spPr>
+          <p:style>
+            <a:lnRef idx="2">
+              <a:schemeClr val="accent1">
+                <a:shade val="50000"/>
+              </a:schemeClr>
+            </a:lnRef>
+            <a:fillRef idx="1">
+              <a:schemeClr val="accent1"/>
+            </a:fillRef>
+            <a:effectRef idx="0">
+              <a:schemeClr val="accent1"/>
+            </a:effectRef>
+            <a:fontRef idx="minor">
+              <a:schemeClr val="lt1"/>
+            </a:fontRef>
+          </p:style>
+          <p:txBody>
+            <a:bodyPr rtlCol="0" anchor="ctr"/>
+            <a:lstStyle/>
+            <a:p>
+              <a:pPr algn="ctr"/>
+              <a:r>
+                <a:rPr lang="en-US" sz="1400" dirty="0">
+                  <a:solidFill>
+                    <a:schemeClr val="tx1"/>
+                  </a:solidFill>
+                </a:rPr>
+                <a:t>Power Relay 2 (P2)</a:t>
+              </a:r>
+            </a:p>
+          </p:txBody>
+        </p:sp>
+        <p:sp>
+          <p:nvSpPr>
+            <p:cNvPr id="6" name="Rectangle 5">
+              <a:extLst>
+                <a:ext uri="{FF2B5EF4-FFF2-40B4-BE49-F238E27FC236}">
+                  <a16:creationId xmlns:a16="http://schemas.microsoft.com/office/drawing/2014/main" id="{4333D01C-B3A7-45C0-9B5E-DC18C604D78E}"/>
+                </a:ext>
+              </a:extLst>
+            </p:cNvPr>
+            <p:cNvSpPr/>
+            <p:nvPr/>
+          </p:nvSpPr>
+          <p:spPr>
+            <a:xfrm>
+              <a:off x="1613138" y="3602967"/>
+              <a:ext cx="1302589" cy="750498"/>
+            </a:xfrm>
+            <a:prstGeom prst="rect">
+              <a:avLst/>
+            </a:prstGeom>
+            <a:noFill/>
+            <a:ln>
+              <a:solidFill>
+                <a:schemeClr val="tx1"/>
+              </a:solidFill>
+            </a:ln>
+          </p:spPr>
+          <p:style>
+            <a:lnRef idx="2">
+              <a:schemeClr val="accent1">
+                <a:shade val="50000"/>
+              </a:schemeClr>
+            </a:lnRef>
+            <a:fillRef idx="1">
+              <a:schemeClr val="accent1"/>
+            </a:fillRef>
+            <a:effectRef idx="0">
+              <a:schemeClr val="accent1"/>
+            </a:effectRef>
+            <a:fontRef idx="minor">
+              <a:schemeClr val="lt1"/>
+            </a:fontRef>
+          </p:style>
+          <p:txBody>
+            <a:bodyPr rtlCol="0" anchor="ctr"/>
+            <a:lstStyle/>
+            <a:p>
+              <a:pPr algn="ctr"/>
+              <a:r>
+                <a:rPr lang="en-US" sz="1400" dirty="0">
+                  <a:solidFill>
+                    <a:schemeClr val="tx1"/>
+                  </a:solidFill>
+                </a:rPr>
+                <a:t>Power Relay 3 (P3)</a:t>
+              </a:r>
+            </a:p>
+          </p:txBody>
+        </p:sp>
+        <p:sp>
+          <p:nvSpPr>
+            <p:cNvPr id="7" name="Rectangle 6">
+              <a:extLst>
+                <a:ext uri="{FF2B5EF4-FFF2-40B4-BE49-F238E27FC236}">
+                  <a16:creationId xmlns:a16="http://schemas.microsoft.com/office/drawing/2014/main" id="{DB609211-270A-4B10-9AF1-0F949492BEF2}"/>
+                </a:ext>
+              </a:extLst>
+            </p:cNvPr>
+            <p:cNvSpPr/>
+            <p:nvPr/>
+          </p:nvSpPr>
+          <p:spPr>
+            <a:xfrm>
+              <a:off x="4090360" y="1209135"/>
+              <a:ext cx="1302589" cy="750498"/>
+            </a:xfrm>
+            <a:prstGeom prst="rect">
+              <a:avLst/>
+            </a:prstGeom>
+            <a:noFill/>
+            <a:ln>
+              <a:solidFill>
+                <a:schemeClr val="tx1"/>
+              </a:solidFill>
+            </a:ln>
+          </p:spPr>
+          <p:style>
+            <a:lnRef idx="2">
+              <a:schemeClr val="accent1">
+                <a:shade val="50000"/>
+              </a:schemeClr>
+            </a:lnRef>
+            <a:fillRef idx="1">
+              <a:schemeClr val="accent1"/>
+            </a:fillRef>
+            <a:effectRef idx="0">
+              <a:schemeClr val="accent1"/>
+            </a:effectRef>
+            <a:fontRef idx="minor">
+              <a:schemeClr val="lt1"/>
+            </a:fontRef>
+          </p:style>
+          <p:txBody>
+            <a:bodyPr rtlCol="0" anchor="ctr"/>
+            <a:lstStyle/>
+            <a:p>
+              <a:pPr algn="ctr"/>
+              <a:r>
+                <a:rPr lang="en-US" sz="1400" dirty="0">
+                  <a:solidFill>
+                    <a:schemeClr val="tx1"/>
+                  </a:solidFill>
+                </a:rPr>
+                <a:t>Power Conditioning Unit 1 (PCU1)</a:t>
+              </a:r>
+            </a:p>
+          </p:txBody>
+        </p:sp>
+        <p:sp>
+          <p:nvSpPr>
+            <p:cNvPr id="8" name="Rectangle 7">
+              <a:extLst>
+                <a:ext uri="{FF2B5EF4-FFF2-40B4-BE49-F238E27FC236}">
+                  <a16:creationId xmlns:a16="http://schemas.microsoft.com/office/drawing/2014/main" id="{33C194CF-4C60-4A42-B05B-CF69CEB80BE2}"/>
+                </a:ext>
+              </a:extLst>
+            </p:cNvPr>
+            <p:cNvSpPr/>
+            <p:nvPr/>
+          </p:nvSpPr>
+          <p:spPr>
+            <a:xfrm>
+              <a:off x="4094663" y="2805023"/>
+              <a:ext cx="1302589" cy="750498"/>
+            </a:xfrm>
+            <a:prstGeom prst="rect">
+              <a:avLst/>
+            </a:prstGeom>
+            <a:noFill/>
+            <a:ln>
+              <a:solidFill>
+                <a:schemeClr val="tx1"/>
+              </a:solidFill>
+            </a:ln>
+          </p:spPr>
+          <p:style>
+            <a:lnRef idx="2">
+              <a:schemeClr val="accent1">
+                <a:shade val="50000"/>
+              </a:schemeClr>
+            </a:lnRef>
+            <a:fillRef idx="1">
+              <a:schemeClr val="accent1"/>
+            </a:fillRef>
+            <a:effectRef idx="0">
+              <a:schemeClr val="accent1"/>
+            </a:effectRef>
+            <a:fontRef idx="minor">
+              <a:schemeClr val="lt1"/>
+            </a:fontRef>
+          </p:style>
+          <p:txBody>
+            <a:bodyPr rtlCol="0" anchor="ctr"/>
+            <a:lstStyle/>
+            <a:p>
+              <a:pPr algn="ctr"/>
+              <a:r>
+                <a:rPr lang="en-US" sz="1400" dirty="0">
+                  <a:solidFill>
+                    <a:schemeClr val="tx1"/>
+                  </a:solidFill>
+                </a:rPr>
+                <a:t>Power Conditioning Unit 2 (PCU2)</a:t>
+              </a:r>
+            </a:p>
+          </p:txBody>
+        </p:sp>
+        <p:sp>
+          <p:nvSpPr>
+            <p:cNvPr id="9" name="Rectangle 8">
+              <a:extLst>
+                <a:ext uri="{FF2B5EF4-FFF2-40B4-BE49-F238E27FC236}">
+                  <a16:creationId xmlns:a16="http://schemas.microsoft.com/office/drawing/2014/main" id="{939140ED-A067-4BEB-A28D-98CC473F439F}"/>
+                </a:ext>
+              </a:extLst>
+            </p:cNvPr>
+            <p:cNvSpPr/>
+            <p:nvPr/>
+          </p:nvSpPr>
+          <p:spPr>
+            <a:xfrm>
+              <a:off x="6232585" y="1209135"/>
+              <a:ext cx="1302589" cy="750498"/>
+            </a:xfrm>
+            <a:prstGeom prst="rect">
+              <a:avLst/>
+            </a:prstGeom>
+            <a:noFill/>
+            <a:ln>
+              <a:solidFill>
+                <a:schemeClr val="tx1"/>
+              </a:solidFill>
+            </a:ln>
+          </p:spPr>
+          <p:style>
+            <a:lnRef idx="2">
+              <a:schemeClr val="accent1">
+                <a:shade val="50000"/>
+              </a:schemeClr>
+            </a:lnRef>
+            <a:fillRef idx="1">
+              <a:schemeClr val="accent1"/>
+            </a:fillRef>
+            <a:effectRef idx="0">
+              <a:schemeClr val="accent1"/>
+            </a:effectRef>
+            <a:fontRef idx="minor">
+              <a:schemeClr val="lt1"/>
+            </a:fontRef>
+          </p:style>
+          <p:txBody>
+            <a:bodyPr rtlCol="0" anchor="ctr"/>
+            <a:lstStyle/>
+            <a:p>
+              <a:pPr algn="ctr"/>
+              <a:r>
+                <a:rPr lang="en-US" sz="1400" dirty="0">
+                  <a:solidFill>
+                    <a:schemeClr val="tx1"/>
+                  </a:solidFill>
+                </a:rPr>
+                <a:t>IR Camera (C1)</a:t>
+              </a:r>
+            </a:p>
+          </p:txBody>
+        </p:sp>
+        <p:sp>
+          <p:nvSpPr>
+            <p:cNvPr id="10" name="Rectangle 9">
+              <a:extLst>
+                <a:ext uri="{FF2B5EF4-FFF2-40B4-BE49-F238E27FC236}">
+                  <a16:creationId xmlns:a16="http://schemas.microsoft.com/office/drawing/2014/main" id="{E2C493BB-3497-4ED1-AC35-55A858C8C15C}"/>
+                </a:ext>
+              </a:extLst>
+            </p:cNvPr>
+            <p:cNvSpPr/>
+            <p:nvPr/>
+          </p:nvSpPr>
+          <p:spPr>
+            <a:xfrm>
+              <a:off x="6232585" y="2805023"/>
+              <a:ext cx="1302589" cy="750498"/>
+            </a:xfrm>
+            <a:prstGeom prst="rect">
+              <a:avLst/>
+            </a:prstGeom>
+            <a:noFill/>
+            <a:ln>
+              <a:solidFill>
+                <a:schemeClr val="tx1"/>
+              </a:solidFill>
+            </a:ln>
+          </p:spPr>
+          <p:style>
+            <a:lnRef idx="2">
+              <a:schemeClr val="accent1">
+                <a:shade val="50000"/>
+              </a:schemeClr>
+            </a:lnRef>
+            <a:fillRef idx="1">
+              <a:schemeClr val="accent1"/>
+            </a:fillRef>
+            <a:effectRef idx="0">
+              <a:schemeClr val="accent1"/>
+            </a:effectRef>
+            <a:fontRef idx="minor">
+              <a:schemeClr val="lt1"/>
+            </a:fontRef>
+          </p:style>
+          <p:txBody>
+            <a:bodyPr rtlCol="0" anchor="ctr"/>
+            <a:lstStyle/>
+            <a:p>
+              <a:pPr algn="ctr"/>
+              <a:r>
+                <a:rPr lang="en-US" sz="1400" dirty="0">
+                  <a:solidFill>
+                    <a:schemeClr val="tx1"/>
+                  </a:solidFill>
+                </a:rPr>
+                <a:t>Visible Spectrum Camera (C2)</a:t>
+              </a:r>
+            </a:p>
+          </p:txBody>
+        </p:sp>
+        <p:cxnSp>
+          <p:nvCxnSpPr>
+            <p:cNvPr id="12" name="Connector: Elbow 11">
+              <a:extLst>
+                <a:ext uri="{FF2B5EF4-FFF2-40B4-BE49-F238E27FC236}">
+                  <a16:creationId xmlns:a16="http://schemas.microsoft.com/office/drawing/2014/main" id="{399C5652-4281-40D5-BA57-9245E5920D26}"/>
+                </a:ext>
+              </a:extLst>
+            </p:cNvPr>
+            <p:cNvCxnSpPr>
+              <a:stCxn id="4" idx="3"/>
+            </p:cNvCxnSpPr>
+            <p:nvPr/>
+          </p:nvCxnSpPr>
+          <p:spPr>
+            <a:xfrm>
+              <a:off x="2915727" y="789317"/>
+              <a:ext cx="1174633" cy="642668"/>
+            </a:xfrm>
+            <a:prstGeom prst="bentConnector3">
+              <a:avLst/>
+            </a:prstGeom>
+            <a:ln>
+              <a:solidFill>
+                <a:schemeClr val="tx1"/>
+              </a:solidFill>
+            </a:ln>
+          </p:spPr>
+          <p:style>
+            <a:lnRef idx="1">
+              <a:schemeClr val="accent1"/>
+            </a:lnRef>
+            <a:fillRef idx="0">
+              <a:schemeClr val="accent1"/>
+            </a:fillRef>
+            <a:effectRef idx="0">
+              <a:schemeClr val="accent1"/>
+            </a:effectRef>
+            <a:fontRef idx="minor">
+              <a:schemeClr val="tx1"/>
+            </a:fontRef>
+          </p:style>
+        </p:cxnSp>
+        <p:cxnSp>
+          <p:nvCxnSpPr>
+            <p:cNvPr id="13" name="Connector: Elbow 12">
+              <a:extLst>
+                <a:ext uri="{FF2B5EF4-FFF2-40B4-BE49-F238E27FC236}">
+                  <a16:creationId xmlns:a16="http://schemas.microsoft.com/office/drawing/2014/main" id="{0B7A34C3-0B6A-4496-BFE0-C0DF99464932}"/>
+                </a:ext>
+              </a:extLst>
+            </p:cNvPr>
+            <p:cNvCxnSpPr>
+              <a:cxnSpLocks/>
+              <a:stCxn id="6" idx="3"/>
+            </p:cNvCxnSpPr>
+            <p:nvPr/>
+          </p:nvCxnSpPr>
+          <p:spPr>
+            <a:xfrm flipV="1">
+              <a:off x="2915727" y="3332671"/>
+              <a:ext cx="1174633" cy="645545"/>
+            </a:xfrm>
+            <a:prstGeom prst="bentConnector3">
+              <a:avLst/>
+            </a:prstGeom>
+            <a:ln>
+              <a:solidFill>
+                <a:schemeClr val="tx1"/>
+              </a:solidFill>
+            </a:ln>
+          </p:spPr>
+          <p:style>
+            <a:lnRef idx="1">
+              <a:schemeClr val="accent1"/>
+            </a:lnRef>
+            <a:fillRef idx="0">
+              <a:schemeClr val="accent1"/>
+            </a:fillRef>
+            <a:effectRef idx="0">
+              <a:schemeClr val="accent1"/>
+            </a:effectRef>
+            <a:fontRef idx="minor">
+              <a:schemeClr val="tx1"/>
+            </a:fontRef>
+          </p:style>
+        </p:cxnSp>
+        <p:cxnSp>
+          <p:nvCxnSpPr>
+            <p:cNvPr id="16" name="Connector: Elbow 15">
+              <a:extLst>
+                <a:ext uri="{FF2B5EF4-FFF2-40B4-BE49-F238E27FC236}">
+                  <a16:creationId xmlns:a16="http://schemas.microsoft.com/office/drawing/2014/main" id="{F133D95E-0315-45D8-8579-969BEAD155CB}"/>
+                </a:ext>
+              </a:extLst>
+            </p:cNvPr>
+            <p:cNvCxnSpPr>
+              <a:cxnSpLocks/>
+              <a:stCxn id="5" idx="3"/>
+            </p:cNvCxnSpPr>
+            <p:nvPr/>
+          </p:nvCxnSpPr>
+          <p:spPr>
+            <a:xfrm flipV="1">
+              <a:off x="2915728" y="1739662"/>
+              <a:ext cx="1174632" cy="642666"/>
+            </a:xfrm>
+            <a:prstGeom prst="bentConnector3">
+              <a:avLst/>
+            </a:prstGeom>
+            <a:ln>
+              <a:solidFill>
+                <a:schemeClr val="tx1"/>
+              </a:solidFill>
+            </a:ln>
+          </p:spPr>
+          <p:style>
+            <a:lnRef idx="1">
+              <a:schemeClr val="accent1"/>
+            </a:lnRef>
+            <a:fillRef idx="0">
+              <a:schemeClr val="accent1"/>
+            </a:fillRef>
+            <a:effectRef idx="0">
+              <a:schemeClr val="accent1"/>
+            </a:effectRef>
+            <a:fontRef idx="minor">
+              <a:schemeClr val="tx1"/>
+            </a:fontRef>
+          </p:style>
+        </p:cxnSp>
+        <p:cxnSp>
+          <p:nvCxnSpPr>
+            <p:cNvPr id="20" name="Connector: Elbow 19">
+              <a:extLst>
+                <a:ext uri="{FF2B5EF4-FFF2-40B4-BE49-F238E27FC236}">
+                  <a16:creationId xmlns:a16="http://schemas.microsoft.com/office/drawing/2014/main" id="{A1C5485D-7078-4B72-887C-CAF372288B9C}"/>
+                </a:ext>
+              </a:extLst>
+            </p:cNvPr>
+            <p:cNvCxnSpPr>
+              <a:cxnSpLocks/>
+              <a:stCxn id="5" idx="3"/>
+            </p:cNvCxnSpPr>
+            <p:nvPr/>
+          </p:nvCxnSpPr>
+          <p:spPr>
+            <a:xfrm>
+              <a:off x="2915728" y="2382328"/>
+              <a:ext cx="1174632" cy="642668"/>
+            </a:xfrm>
+            <a:prstGeom prst="bentConnector3">
+              <a:avLst/>
+            </a:prstGeom>
+            <a:ln>
+              <a:solidFill>
+                <a:schemeClr val="tx1"/>
+              </a:solidFill>
+            </a:ln>
+          </p:spPr>
+          <p:style>
+            <a:lnRef idx="1">
+              <a:schemeClr val="accent1"/>
+            </a:lnRef>
+            <a:fillRef idx="0">
+              <a:schemeClr val="accent1"/>
+            </a:fillRef>
+            <a:effectRef idx="0">
+              <a:schemeClr val="accent1"/>
+            </a:effectRef>
+            <a:fontRef idx="minor">
+              <a:schemeClr val="tx1"/>
+            </a:fontRef>
+          </p:style>
+        </p:cxnSp>
+        <p:cxnSp>
+          <p:nvCxnSpPr>
+            <p:cNvPr id="24" name="Straight Connector 23">
+              <a:extLst>
+                <a:ext uri="{FF2B5EF4-FFF2-40B4-BE49-F238E27FC236}">
+                  <a16:creationId xmlns:a16="http://schemas.microsoft.com/office/drawing/2014/main" id="{1827E7BA-4388-4C26-A34A-D04C228A3805}"/>
+                </a:ext>
+              </a:extLst>
+            </p:cNvPr>
+            <p:cNvCxnSpPr>
+              <a:cxnSpLocks/>
+              <a:endCxn id="4" idx="1"/>
+            </p:cNvCxnSpPr>
+            <p:nvPr/>
+          </p:nvCxnSpPr>
+          <p:spPr>
+            <a:xfrm>
+              <a:off x="1069675" y="789317"/>
+              <a:ext cx="543463" cy="0"/>
+            </a:xfrm>
+            <a:prstGeom prst="line">
+              <a:avLst/>
+            </a:prstGeom>
+            <a:ln>
+              <a:solidFill>
+                <a:schemeClr val="tx1"/>
+              </a:solidFill>
+            </a:ln>
+          </p:spPr>
+          <p:style>
+            <a:lnRef idx="1">
+              <a:schemeClr val="accent1"/>
+            </a:lnRef>
+            <a:fillRef idx="0">
+              <a:schemeClr val="accent1"/>
+            </a:fillRef>
+            <a:effectRef idx="0">
+              <a:schemeClr val="accent1"/>
+            </a:effectRef>
+            <a:fontRef idx="minor">
+              <a:schemeClr val="tx1"/>
+            </a:fontRef>
+          </p:style>
+        </p:cxnSp>
+        <p:cxnSp>
+          <p:nvCxnSpPr>
+            <p:cNvPr id="30" name="Straight Connector 29">
+              <a:extLst>
+                <a:ext uri="{FF2B5EF4-FFF2-40B4-BE49-F238E27FC236}">
+                  <a16:creationId xmlns:a16="http://schemas.microsoft.com/office/drawing/2014/main" id="{C8F28EA7-D235-4C85-B572-146E03380562}"/>
+                </a:ext>
+              </a:extLst>
+            </p:cNvPr>
+            <p:cNvCxnSpPr>
+              <a:stCxn id="7" idx="3"/>
+              <a:endCxn id="9" idx="1"/>
+            </p:cNvCxnSpPr>
+            <p:nvPr/>
+          </p:nvCxnSpPr>
+          <p:spPr>
+            <a:xfrm>
+              <a:off x="5392949" y="1584384"/>
+              <a:ext cx="839636" cy="0"/>
+            </a:xfrm>
+            <a:prstGeom prst="line">
+              <a:avLst/>
+            </a:prstGeom>
+            <a:ln>
+              <a:solidFill>
+                <a:schemeClr val="tx1"/>
+              </a:solidFill>
+            </a:ln>
+          </p:spPr>
+          <p:style>
+            <a:lnRef idx="1">
+              <a:schemeClr val="accent1"/>
+            </a:lnRef>
+            <a:fillRef idx="0">
+              <a:schemeClr val="accent1"/>
+            </a:fillRef>
+            <a:effectRef idx="0">
+              <a:schemeClr val="accent1"/>
+            </a:effectRef>
+            <a:fontRef idx="minor">
+              <a:schemeClr val="tx1"/>
+            </a:fontRef>
+          </p:style>
+        </p:cxnSp>
+        <p:cxnSp>
+          <p:nvCxnSpPr>
+            <p:cNvPr id="32" name="Straight Connector 31">
+              <a:extLst>
+                <a:ext uri="{FF2B5EF4-FFF2-40B4-BE49-F238E27FC236}">
+                  <a16:creationId xmlns:a16="http://schemas.microsoft.com/office/drawing/2014/main" id="{E06E2927-3A97-4C45-B30C-038BD6D82274}"/>
+                </a:ext>
+              </a:extLst>
+            </p:cNvPr>
+            <p:cNvCxnSpPr>
+              <a:stCxn id="8" idx="3"/>
+              <a:endCxn id="10" idx="1"/>
+            </p:cNvCxnSpPr>
+            <p:nvPr/>
+          </p:nvCxnSpPr>
+          <p:spPr>
+            <a:xfrm>
+              <a:off x="5397252" y="3180272"/>
+              <a:ext cx="835333" cy="0"/>
+            </a:xfrm>
+            <a:prstGeom prst="line">
+              <a:avLst/>
+            </a:prstGeom>
+            <a:ln>
+              <a:solidFill>
+                <a:schemeClr val="tx1"/>
+              </a:solidFill>
+            </a:ln>
+          </p:spPr>
+          <p:style>
+            <a:lnRef idx="1">
+              <a:schemeClr val="accent1"/>
+            </a:lnRef>
+            <a:fillRef idx="0">
+              <a:schemeClr val="accent1"/>
+            </a:fillRef>
+            <a:effectRef idx="0">
+              <a:schemeClr val="accent1"/>
+            </a:effectRef>
+            <a:fontRef idx="minor">
+              <a:schemeClr val="tx1"/>
+            </a:fontRef>
+          </p:style>
+        </p:cxnSp>
+        <p:cxnSp>
+          <p:nvCxnSpPr>
+            <p:cNvPr id="42" name="Straight Connector 41">
+              <a:extLst>
+                <a:ext uri="{FF2B5EF4-FFF2-40B4-BE49-F238E27FC236}">
+                  <a16:creationId xmlns:a16="http://schemas.microsoft.com/office/drawing/2014/main" id="{7607FE7A-3739-480F-AE01-9C9CB3574BFC}"/>
+                </a:ext>
+              </a:extLst>
+            </p:cNvPr>
+            <p:cNvCxnSpPr>
+              <a:cxnSpLocks/>
+              <a:endCxn id="5" idx="1"/>
+            </p:cNvCxnSpPr>
+            <p:nvPr/>
+          </p:nvCxnSpPr>
+          <p:spPr>
+            <a:xfrm>
+              <a:off x="1069675" y="2382328"/>
+              <a:ext cx="543464" cy="0"/>
+            </a:xfrm>
+            <a:prstGeom prst="line">
+              <a:avLst/>
+            </a:prstGeom>
+            <a:ln>
+              <a:solidFill>
+                <a:schemeClr val="tx1"/>
+              </a:solidFill>
+            </a:ln>
+          </p:spPr>
+          <p:style>
+            <a:lnRef idx="1">
+              <a:schemeClr val="accent1"/>
+            </a:lnRef>
+            <a:fillRef idx="0">
+              <a:schemeClr val="accent1"/>
+            </a:fillRef>
+            <a:effectRef idx="0">
+              <a:schemeClr val="accent1"/>
+            </a:effectRef>
+            <a:fontRef idx="minor">
+              <a:schemeClr val="tx1"/>
+            </a:fontRef>
+          </p:style>
+        </p:cxnSp>
+        <p:cxnSp>
+          <p:nvCxnSpPr>
+            <p:cNvPr id="44" name="Straight Connector 43">
+              <a:extLst>
+                <a:ext uri="{FF2B5EF4-FFF2-40B4-BE49-F238E27FC236}">
+                  <a16:creationId xmlns:a16="http://schemas.microsoft.com/office/drawing/2014/main" id="{A7B8B0FB-CEC8-4901-AB9E-2A2BAE96FB26}"/>
+                </a:ext>
+              </a:extLst>
+            </p:cNvPr>
+            <p:cNvCxnSpPr>
+              <a:cxnSpLocks/>
+              <a:endCxn id="6" idx="1"/>
+            </p:cNvCxnSpPr>
+            <p:nvPr/>
+          </p:nvCxnSpPr>
+          <p:spPr>
+            <a:xfrm>
+              <a:off x="1069675" y="3978216"/>
+              <a:ext cx="543463" cy="0"/>
+            </a:xfrm>
+            <a:prstGeom prst="line">
+              <a:avLst/>
+            </a:prstGeom>
+            <a:ln>
+              <a:solidFill>
+                <a:schemeClr val="tx1"/>
+              </a:solidFill>
+            </a:ln>
+          </p:spPr>
+          <p:style>
+            <a:lnRef idx="1">
+              <a:schemeClr val="accent1"/>
+            </a:lnRef>
+            <a:fillRef idx="0">
+              <a:schemeClr val="accent1"/>
+            </a:fillRef>
+            <a:effectRef idx="0">
+              <a:schemeClr val="accent1"/>
+            </a:effectRef>
+            <a:fontRef idx="minor">
+              <a:schemeClr val="tx1"/>
+            </a:fontRef>
+          </p:style>
+        </p:cxnSp>
+        <p:cxnSp>
+          <p:nvCxnSpPr>
+            <p:cNvPr id="61" name="Straight Connector 60">
+              <a:extLst>
+                <a:ext uri="{FF2B5EF4-FFF2-40B4-BE49-F238E27FC236}">
+                  <a16:creationId xmlns:a16="http://schemas.microsoft.com/office/drawing/2014/main" id="{95D7450E-1402-49FF-AD32-60CB96ADA7C5}"/>
+                </a:ext>
+              </a:extLst>
+            </p:cNvPr>
+            <p:cNvCxnSpPr>
+              <a:cxnSpLocks/>
+            </p:cNvCxnSpPr>
+            <p:nvPr/>
+          </p:nvCxnSpPr>
+          <p:spPr>
+            <a:xfrm>
+              <a:off x="7535174" y="1559942"/>
+              <a:ext cx="543463" cy="0"/>
+            </a:xfrm>
+            <a:prstGeom prst="line">
+              <a:avLst/>
+            </a:prstGeom>
+            <a:ln>
+              <a:solidFill>
+                <a:schemeClr val="tx1"/>
+              </a:solidFill>
+            </a:ln>
+          </p:spPr>
+          <p:style>
+            <a:lnRef idx="1">
+              <a:schemeClr val="accent1"/>
+            </a:lnRef>
+            <a:fillRef idx="0">
+              <a:schemeClr val="accent1"/>
+            </a:fillRef>
+            <a:effectRef idx="0">
+              <a:schemeClr val="accent1"/>
+            </a:effectRef>
+            <a:fontRef idx="minor">
+              <a:schemeClr val="tx1"/>
+            </a:fontRef>
+          </p:style>
+        </p:cxnSp>
+        <p:sp>
+          <p:nvSpPr>
+            <p:cNvPr id="63" name="TextBox 62">
+              <a:extLst>
+                <a:ext uri="{FF2B5EF4-FFF2-40B4-BE49-F238E27FC236}">
+                  <a16:creationId xmlns:a16="http://schemas.microsoft.com/office/drawing/2014/main" id="{E01D2A66-D6B5-4705-A4F9-4AFB5EA159B9}"/>
+                </a:ext>
+              </a:extLst>
+            </p:cNvPr>
+            <p:cNvSpPr txBox="1"/>
+            <p:nvPr/>
+          </p:nvSpPr>
+          <p:spPr>
+            <a:xfrm>
+              <a:off x="999995" y="500332"/>
+              <a:ext cx="655949" cy="369332"/>
+            </a:xfrm>
+            <a:prstGeom prst="rect">
+              <a:avLst/>
+            </a:prstGeom>
+            <a:noFill/>
+          </p:spPr>
+          <p:txBody>
+            <a:bodyPr wrap="none" rtlCol="0">
+              <a:spAutoFit/>
+            </a:bodyPr>
+            <a:lstStyle/>
+            <a:p>
+              <a:r>
+                <a:rPr lang="en-US" dirty="0"/>
+                <a:t>A = 1</a:t>
+              </a:r>
+            </a:p>
+          </p:txBody>
+        </p:sp>
+        <p:sp>
+          <p:nvSpPr>
+            <p:cNvPr id="64" name="TextBox 63">
+              <a:extLst>
+                <a:ext uri="{FF2B5EF4-FFF2-40B4-BE49-F238E27FC236}">
+                  <a16:creationId xmlns:a16="http://schemas.microsoft.com/office/drawing/2014/main" id="{05F515A2-1781-443E-9104-2E5B061E4575}"/>
+                </a:ext>
+              </a:extLst>
+            </p:cNvPr>
+            <p:cNvSpPr txBox="1"/>
+            <p:nvPr/>
+          </p:nvSpPr>
+          <p:spPr>
+            <a:xfrm>
+              <a:off x="999995" y="2060274"/>
+              <a:ext cx="647934" cy="369332"/>
+            </a:xfrm>
+            <a:prstGeom prst="rect">
+              <a:avLst/>
+            </a:prstGeom>
+            <a:noFill/>
+          </p:spPr>
+          <p:txBody>
+            <a:bodyPr wrap="none" rtlCol="0">
+              <a:spAutoFit/>
+            </a:bodyPr>
+            <a:lstStyle/>
+            <a:p>
+              <a:r>
+                <a:rPr lang="en-US" dirty="0"/>
+                <a:t>B = 1</a:t>
+              </a:r>
+            </a:p>
+          </p:txBody>
+        </p:sp>
+        <p:sp>
+          <p:nvSpPr>
+            <p:cNvPr id="65" name="TextBox 64">
+              <a:extLst>
+                <a:ext uri="{FF2B5EF4-FFF2-40B4-BE49-F238E27FC236}">
+                  <a16:creationId xmlns:a16="http://schemas.microsoft.com/office/drawing/2014/main" id="{5CDEFD57-A624-48D0-A3EA-8DD31419AAF2}"/>
+                </a:ext>
+              </a:extLst>
+            </p:cNvPr>
+            <p:cNvSpPr txBox="1"/>
+            <p:nvPr/>
+          </p:nvSpPr>
+          <p:spPr>
+            <a:xfrm>
+              <a:off x="1025207" y="3667662"/>
+              <a:ext cx="646331" cy="369332"/>
+            </a:xfrm>
+            <a:prstGeom prst="rect">
+              <a:avLst/>
+            </a:prstGeom>
+            <a:noFill/>
+          </p:spPr>
+          <p:txBody>
+            <a:bodyPr wrap="none" rtlCol="0">
+              <a:spAutoFit/>
+            </a:bodyPr>
+            <a:lstStyle/>
+            <a:p>
+              <a:r>
+                <a:rPr lang="en-US" dirty="0"/>
+                <a:t>C = 1</a:t>
+              </a:r>
+            </a:p>
+          </p:txBody>
+        </p:sp>
+        <p:sp>
+          <p:nvSpPr>
+            <p:cNvPr id="66" name="TextBox 65">
+              <a:extLst>
+                <a:ext uri="{FF2B5EF4-FFF2-40B4-BE49-F238E27FC236}">
+                  <a16:creationId xmlns:a16="http://schemas.microsoft.com/office/drawing/2014/main" id="{F7FB3522-E6D1-4257-AF95-C96F8AFF478F}"/>
+                </a:ext>
+              </a:extLst>
+            </p:cNvPr>
+            <p:cNvSpPr txBox="1"/>
+            <p:nvPr/>
+          </p:nvSpPr>
+          <p:spPr>
+            <a:xfrm>
+              <a:off x="7643238" y="1247319"/>
+              <a:ext cx="665567" cy="369332"/>
+            </a:xfrm>
+            <a:prstGeom prst="rect">
+              <a:avLst/>
+            </a:prstGeom>
+            <a:noFill/>
+          </p:spPr>
+          <p:txBody>
+            <a:bodyPr wrap="none" rtlCol="0">
+              <a:spAutoFit/>
+            </a:bodyPr>
+            <a:lstStyle/>
+            <a:p>
+              <a:r>
+                <a:rPr lang="en-US" dirty="0"/>
+                <a:t>D = 0</a:t>
+              </a:r>
+            </a:p>
+          </p:txBody>
+        </p:sp>
+        <p:cxnSp>
+          <p:nvCxnSpPr>
+            <p:cNvPr id="68" name="Straight Connector 67">
+              <a:extLst>
+                <a:ext uri="{FF2B5EF4-FFF2-40B4-BE49-F238E27FC236}">
+                  <a16:creationId xmlns:a16="http://schemas.microsoft.com/office/drawing/2014/main" id="{F193A147-1F98-4287-871F-FAAD1B72E347}"/>
+                </a:ext>
+              </a:extLst>
+            </p:cNvPr>
+            <p:cNvCxnSpPr>
+              <a:cxnSpLocks/>
+              <a:stCxn id="10" idx="3"/>
+            </p:cNvCxnSpPr>
+            <p:nvPr/>
+          </p:nvCxnSpPr>
+          <p:spPr>
+            <a:xfrm>
+              <a:off x="7535174" y="3180272"/>
+              <a:ext cx="543463" cy="0"/>
+            </a:xfrm>
+            <a:prstGeom prst="line">
+              <a:avLst/>
+            </a:prstGeom>
+            <a:ln>
+              <a:solidFill>
+                <a:schemeClr val="tx1"/>
+              </a:solidFill>
+            </a:ln>
+          </p:spPr>
+          <p:style>
+            <a:lnRef idx="1">
+              <a:schemeClr val="accent1"/>
+            </a:lnRef>
+            <a:fillRef idx="0">
+              <a:schemeClr val="accent1"/>
+            </a:fillRef>
+            <a:effectRef idx="0">
+              <a:schemeClr val="accent1"/>
+            </a:effectRef>
+            <a:fontRef idx="minor">
+              <a:schemeClr val="tx1"/>
+            </a:fontRef>
+          </p:style>
+        </p:cxnSp>
+        <p:sp>
+          <p:nvSpPr>
+            <p:cNvPr id="70" name="TextBox 69">
+              <a:extLst>
+                <a:ext uri="{FF2B5EF4-FFF2-40B4-BE49-F238E27FC236}">
+                  <a16:creationId xmlns:a16="http://schemas.microsoft.com/office/drawing/2014/main" id="{B3CC5F49-9997-4388-BF44-C0547C5E89BE}"/>
+                </a:ext>
+              </a:extLst>
+            </p:cNvPr>
+            <p:cNvSpPr txBox="1"/>
+            <p:nvPr/>
+          </p:nvSpPr>
+          <p:spPr>
+            <a:xfrm>
+              <a:off x="7643238" y="2840330"/>
+              <a:ext cx="635110" cy="369332"/>
+            </a:xfrm>
+            <a:prstGeom prst="rect">
+              <a:avLst/>
+            </a:prstGeom>
+            <a:noFill/>
+          </p:spPr>
+          <p:txBody>
+            <a:bodyPr wrap="none" rtlCol="0">
+              <a:spAutoFit/>
+            </a:bodyPr>
+            <a:lstStyle/>
+            <a:p>
+              <a:r>
+                <a:rPr lang="en-US" dirty="0"/>
+                <a:t>E = 0</a:t>
+              </a:r>
+            </a:p>
+          </p:txBody>
+        </p:sp>
+        <p:sp>
+          <p:nvSpPr>
+            <p:cNvPr id="74" name="TextBox 73">
+              <a:extLst>
+                <a:ext uri="{FF2B5EF4-FFF2-40B4-BE49-F238E27FC236}">
+                  <a16:creationId xmlns:a16="http://schemas.microsoft.com/office/drawing/2014/main" id="{DFAC674C-EB5A-4129-A103-326C23BE7940}"/>
+                </a:ext>
+              </a:extLst>
+            </p:cNvPr>
+            <p:cNvSpPr txBox="1"/>
+            <p:nvPr/>
+          </p:nvSpPr>
+          <p:spPr>
+            <a:xfrm>
+              <a:off x="3036496" y="481640"/>
+              <a:ext cx="316112" cy="369332"/>
+            </a:xfrm>
+            <a:prstGeom prst="rect">
+              <a:avLst/>
+            </a:prstGeom>
+            <a:noFill/>
+          </p:spPr>
+          <p:txBody>
+            <a:bodyPr wrap="none" rtlCol="0">
+              <a:spAutoFit/>
+            </a:bodyPr>
+            <a:lstStyle/>
+            <a:p>
+              <a:r>
+                <a:rPr lang="en-US" dirty="0"/>
+                <a:t>V</a:t>
+              </a:r>
+            </a:p>
+          </p:txBody>
+        </p:sp>
+        <p:sp>
+          <p:nvSpPr>
+            <p:cNvPr id="75" name="TextBox 74">
+              <a:extLst>
+                <a:ext uri="{FF2B5EF4-FFF2-40B4-BE49-F238E27FC236}">
+                  <a16:creationId xmlns:a16="http://schemas.microsoft.com/office/drawing/2014/main" id="{C74760B5-8613-444A-871C-1BAFC308C874}"/>
+                </a:ext>
+              </a:extLst>
+            </p:cNvPr>
+            <p:cNvSpPr txBox="1"/>
+            <p:nvPr/>
+          </p:nvSpPr>
+          <p:spPr>
+            <a:xfrm>
+              <a:off x="2999627" y="2078962"/>
+              <a:ext cx="389850" cy="369332"/>
+            </a:xfrm>
+            <a:prstGeom prst="rect">
+              <a:avLst/>
+            </a:prstGeom>
+            <a:noFill/>
+          </p:spPr>
+          <p:txBody>
+            <a:bodyPr wrap="none" rtlCol="0">
+              <a:spAutoFit/>
+            </a:bodyPr>
+            <a:lstStyle/>
+            <a:p>
+              <a:r>
+                <a:rPr lang="en-US" dirty="0"/>
+                <a:t>W</a:t>
+              </a:r>
+            </a:p>
+          </p:txBody>
+        </p:sp>
+        <p:sp>
+          <p:nvSpPr>
+            <p:cNvPr id="76" name="TextBox 75">
+              <a:extLst>
+                <a:ext uri="{FF2B5EF4-FFF2-40B4-BE49-F238E27FC236}">
+                  <a16:creationId xmlns:a16="http://schemas.microsoft.com/office/drawing/2014/main" id="{C0144458-D844-475B-A335-ED60CB90E42F}"/>
+                </a:ext>
+              </a:extLst>
+            </p:cNvPr>
+            <p:cNvSpPr txBox="1"/>
+            <p:nvPr/>
+          </p:nvSpPr>
+          <p:spPr>
+            <a:xfrm>
+              <a:off x="3042106" y="3667662"/>
+              <a:ext cx="304892" cy="369332"/>
+            </a:xfrm>
+            <a:prstGeom prst="rect">
+              <a:avLst/>
+            </a:prstGeom>
+            <a:noFill/>
+          </p:spPr>
+          <p:txBody>
+            <a:bodyPr wrap="none" rtlCol="0">
+              <a:spAutoFit/>
+            </a:bodyPr>
+            <a:lstStyle/>
+            <a:p>
+              <a:r>
+                <a:rPr lang="en-US" dirty="0"/>
+                <a:t>X</a:t>
+              </a:r>
+            </a:p>
+          </p:txBody>
+        </p:sp>
+        <p:sp>
+          <p:nvSpPr>
+            <p:cNvPr id="77" name="TextBox 76">
+              <a:extLst>
+                <a:ext uri="{FF2B5EF4-FFF2-40B4-BE49-F238E27FC236}">
+                  <a16:creationId xmlns:a16="http://schemas.microsoft.com/office/drawing/2014/main" id="{FF95B563-5830-490E-B99C-16828EA999C6}"/>
+                </a:ext>
+              </a:extLst>
+            </p:cNvPr>
+            <p:cNvSpPr txBox="1"/>
+            <p:nvPr/>
+          </p:nvSpPr>
+          <p:spPr>
+            <a:xfrm>
+              <a:off x="5664329" y="1302760"/>
+              <a:ext cx="296876" cy="369332"/>
+            </a:xfrm>
+            <a:prstGeom prst="rect">
+              <a:avLst/>
+            </a:prstGeom>
+            <a:noFill/>
+          </p:spPr>
+          <p:txBody>
+            <a:bodyPr wrap="none" rtlCol="0">
+              <a:spAutoFit/>
+            </a:bodyPr>
+            <a:lstStyle/>
+            <a:p>
+              <a:r>
+                <a:rPr lang="en-US" dirty="0"/>
+                <a:t>Y</a:t>
+              </a:r>
+            </a:p>
+          </p:txBody>
+        </p:sp>
+        <p:sp>
+          <p:nvSpPr>
+            <p:cNvPr id="78" name="TextBox 77">
+              <a:extLst>
+                <a:ext uri="{FF2B5EF4-FFF2-40B4-BE49-F238E27FC236}">
+                  <a16:creationId xmlns:a16="http://schemas.microsoft.com/office/drawing/2014/main" id="{EE719C06-C54B-4F69-ADC3-3F2F3E2F5EB6}"/>
+                </a:ext>
+              </a:extLst>
+            </p:cNvPr>
+            <p:cNvSpPr txBox="1"/>
+            <p:nvPr/>
+          </p:nvSpPr>
+          <p:spPr>
+            <a:xfrm>
+              <a:off x="5689855" y="2889847"/>
+              <a:ext cx="254109" cy="369332"/>
+            </a:xfrm>
+            <a:prstGeom prst="rect">
+              <a:avLst/>
+            </a:prstGeom>
+            <a:noFill/>
+          </p:spPr>
+          <p:txBody>
+            <a:bodyPr wrap="square" rtlCol="0">
+              <a:spAutoFit/>
+            </a:bodyPr>
+            <a:lstStyle/>
+            <a:p>
+              <a:r>
+                <a:rPr lang="en-US" dirty="0"/>
+                <a:t>Z</a:t>
+              </a:r>
+            </a:p>
+          </p:txBody>
+        </p:sp>
+      </p:grpSp>
+    </p:spTree>
+    <p:extLst>
+      <p:ext uri="{BB962C8B-B14F-4D97-AF65-F5344CB8AC3E}">
+        <p14:creationId xmlns:p14="http://schemas.microsoft.com/office/powerpoint/2010/main" val="2298552989"/>
+      </p:ext>
+    </p:extLst>
+  </p:cSld>
+  <p:clrMapOvr>
+    <a:masterClrMapping/>
+  </p:clrMapOvr>
+</p:sld>
+</file>
+
 <file path=ppt/theme/theme1.xml><?xml version="1.0" encoding="utf-8"?>
 <a:theme xmlns:a="http://schemas.openxmlformats.org/drawingml/2006/main" name="Office Theme">
   <a:themeElements>
@@ -10505,6 +11858,21 @@
 </file>
 
 <file path=customXml/item1.xml><?xml version="1.0" encoding="utf-8"?>
+<p:properties xmlns:p="http://schemas.microsoft.com/office/2006/metadata/properties" xmlns:xsi="http://www.w3.org/2001/XMLSchema-instance" xmlns:pc="http://schemas.microsoft.com/office/infopath/2007/PartnerControls">
+  <documentManagement/>
+</p:properties>
+</file>
+
+<file path=customXml/item2.xml><?xml version="1.0" encoding="utf-8"?>
+<?mso-contentType ?>
+<FormTemplates xmlns="http://schemas.microsoft.com/sharepoint/v3/contenttype/forms">
+  <Display>DocumentLibraryForm</Display>
+  <Edit>DocumentLibraryForm</Edit>
+  <New>DocumentLibraryForm</New>
+</FormTemplates>
+</file>
+
+<file path=customXml/item3.xml><?xml version="1.0" encoding="utf-8"?>
 <ct:contentTypeSchema xmlns:ct="http://schemas.microsoft.com/office/2006/metadata/contentType" xmlns:ma="http://schemas.microsoft.com/office/2006/metadata/properties/metaAttributes" ct:_="" ma:_="" ma:contentTypeName="Document" ma:contentTypeID="0x0101008CE6DA3D4640C546B036DF3294D0D54B" ma:contentTypeVersion="11" ma:contentTypeDescription="Create a new document." ma:contentTypeScope="" ma:versionID="fdb193dc7160622a03aa50fdf151b2ef">
   <xsd:schema xmlns:xsd="http://www.w3.org/2001/XMLSchema" xmlns:xs="http://www.w3.org/2001/XMLSchema" xmlns:p="http://schemas.microsoft.com/office/2006/metadata/properties" xmlns:ns3="bcb3ac5f-01e2-41ad-b451-1fdd9db804f2" targetNamespace="http://schemas.microsoft.com/office/2006/metadata/properties" ma:root="true" ma:fieldsID="a4fdae3fb026054434bcbe743a583fbd" ns3:_="">
     <xsd:import namespace="bcb3ac5f-01e2-41ad-b451-1fdd9db804f2"/>
@@ -10694,22 +12062,31 @@
 </ct:contentTypeSchema>
 </file>
 
-<file path=customXml/item2.xml><?xml version="1.0" encoding="utf-8"?>
-<?mso-contentType ?>
-<FormTemplates xmlns="http://schemas.microsoft.com/sharepoint/v3/contenttype/forms">
-  <Display>DocumentLibraryForm</Display>
-  <Edit>DocumentLibraryForm</Edit>
-  <New>DocumentLibraryForm</New>
-</FormTemplates>
+<file path=customXml/itemProps1.xml><?xml version="1.0" encoding="utf-8"?>
+<ds:datastoreItem xmlns:ds="http://schemas.openxmlformats.org/officeDocument/2006/customXml" ds:itemID="{197AE0C9-93A1-4CCC-BD97-2030B997B33F}">
+  <ds:schemaRefs>
+    <ds:schemaRef ds:uri="http://purl.org/dc/elements/1.1/"/>
+    <ds:schemaRef ds:uri="http://schemas.microsoft.com/office/2006/metadata/properties"/>
+    <ds:schemaRef ds:uri="http://schemas.microsoft.com/office/2006/documentManagement/types"/>
+    <ds:schemaRef ds:uri="http://schemas.openxmlformats.org/package/2006/metadata/core-properties"/>
+    <ds:schemaRef ds:uri="bcb3ac5f-01e2-41ad-b451-1fdd9db804f2"/>
+    <ds:schemaRef ds:uri="http://purl.org/dc/dcmitype/"/>
+    <ds:schemaRef ds:uri="http://schemas.microsoft.com/office/infopath/2007/PartnerControls"/>
+    <ds:schemaRef ds:uri="http://www.w3.org/XML/1998/namespace"/>
+    <ds:schemaRef ds:uri="http://purl.org/dc/terms/"/>
+  </ds:schemaRefs>
+</ds:datastoreItem>
 </file>
 
-<file path=customXml/item3.xml><?xml version="1.0" encoding="utf-8"?>
-<p:properties xmlns:p="http://schemas.microsoft.com/office/2006/metadata/properties" xmlns:xsi="http://www.w3.org/2001/XMLSchema-instance" xmlns:pc="http://schemas.microsoft.com/office/infopath/2007/PartnerControls">
-  <documentManagement/>
-</p:properties>
+<file path=customXml/itemProps2.xml><?xml version="1.0" encoding="utf-8"?>
+<ds:datastoreItem xmlns:ds="http://schemas.openxmlformats.org/officeDocument/2006/customXml" ds:itemID="{79CF8999-3AB2-42A7-BD51-60DE976F9F5E}">
+  <ds:schemaRefs>
+    <ds:schemaRef ds:uri="http://schemas.microsoft.com/sharepoint/v3/contenttype/forms"/>
+  </ds:schemaRefs>
+</ds:datastoreItem>
 </file>
 
-<file path=customXml/itemProps1.xml><?xml version="1.0" encoding="utf-8"?>
+<file path=customXml/itemProps3.xml><?xml version="1.0" encoding="utf-8"?>
 <ds:datastoreItem xmlns:ds="http://schemas.openxmlformats.org/officeDocument/2006/customXml" ds:itemID="{B1CDE79A-1E16-4174-A5A9-B1CF2C968E42}">
   <ds:schemaRefs>
     <ds:schemaRef ds:uri="http://schemas.microsoft.com/office/2006/metadata/contentType"/>
@@ -10725,28 +12102,4 @@
     <ds:schemaRef ds:uri="http://schemas.microsoft.com/internal/obd"/>
   </ds:schemaRefs>
 </ds:datastoreItem>
-</file>
-
-<file path=customXml/itemProps2.xml><?xml version="1.0" encoding="utf-8"?>
-<ds:datastoreItem xmlns:ds="http://schemas.openxmlformats.org/officeDocument/2006/customXml" ds:itemID="{79CF8999-3AB2-42A7-BD51-60DE976F9F5E}">
-  <ds:schemaRefs>
-    <ds:schemaRef ds:uri="http://schemas.microsoft.com/sharepoint/v3/contenttype/forms"/>
-  </ds:schemaRefs>
-</ds:datastoreItem>
-</file>
-
-<file path=customXml/itemProps3.xml><?xml version="1.0" encoding="utf-8"?>
-<ds:datastoreItem xmlns:ds="http://schemas.openxmlformats.org/officeDocument/2006/customXml" ds:itemID="{197AE0C9-93A1-4CCC-BD97-2030B997B33F}">
-  <ds:schemaRefs>
-    <ds:schemaRef ds:uri="http://purl.org/dc/elements/1.1/"/>
-    <ds:schemaRef ds:uri="http://schemas.microsoft.com/office/2006/metadata/properties"/>
-    <ds:schemaRef ds:uri="http://purl.org/dc/terms/"/>
-    <ds:schemaRef ds:uri="http://schemas.openxmlformats.org/package/2006/metadata/core-properties"/>
-    <ds:schemaRef ds:uri="bcb3ac5f-01e2-41ad-b451-1fdd9db804f2"/>
-    <ds:schemaRef ds:uri="http://schemas.microsoft.com/office/2006/documentManagement/types"/>
-    <ds:schemaRef ds:uri="http://schemas.microsoft.com/office/infopath/2007/PartnerControls"/>
-    <ds:schemaRef ds:uri="http://www.w3.org/XML/1998/namespace"/>
-    <ds:schemaRef ds:uri="http://purl.org/dc/dcmitype/"/>
-  </ds:schemaRefs>
-</ds:datastoreItem>
 </file>
</xml_diff>